<commit_message>
near finished with sas reader post
</commit_message>
<xml_diff>
--- a/blog/2024/2024_05__sas_reader_matlab/sas_format_notes.pptx
+++ b/blog/2024/2024_05__sas_reader_matlab/sas_format_notes.pptx
@@ -2,12 +2,12 @@
 <file path=ppt/presentation.xml><?xml version="1.0" encoding="utf-8"?>
 <p:presentation xmlns:a="http://schemas.openxmlformats.org/drawingml/2006/main" xmlns:r="http://schemas.openxmlformats.org/officeDocument/2006/relationships" xmlns:p="http://schemas.openxmlformats.org/presentationml/2006/main" saveSubsetFonts="1" autoCompressPictures="0">
   <p:sldMasterIdLst>
-    <p:sldMasterId id="2147483660" r:id="rId1"/>
+    <p:sldMasterId id="2147483672" r:id="rId1"/>
   </p:sldMasterIdLst>
   <p:sldIdLst>
     <p:sldId id="256" r:id="rId2"/>
   </p:sldIdLst>
-  <p:sldSz cx="12192000" cy="11887200"/>
+  <p:sldSz cx="11704638" cy="11887200"/>
   <p:notesSz cx="6858000" cy="9144000"/>
   <p:defaultTextStyle>
     <a:defPPr>
@@ -104,6 +104,11 @@
       </a:defRPr>
     </a:lvl9pPr>
   </p:defaultTextStyle>
+  <p:extLst>
+    <p:ext uri="{EFAFB233-063F-42B5-8137-9DF3F51BA10A}">
+      <p15:sldGuideLst xmlns:p15="http://schemas.microsoft.com/office/powerpoint/2012/main"/>
+    </p:ext>
+  </p:extLst>
 </p:presentation>
 </file>
 
@@ -136,15 +141,15 @@
         </p:nvSpPr>
         <p:spPr>
           <a:xfrm>
-            <a:off x="914400" y="1945429"/>
-            <a:ext cx="10363200" cy="4138507"/>
+            <a:off x="877848" y="1945429"/>
+            <a:ext cx="9948942" cy="4138507"/>
           </a:xfrm>
         </p:spPr>
         <p:txBody>
           <a:bodyPr anchor="b"/>
           <a:lstStyle>
             <a:lvl1pPr algn="ctr">
-              <a:defRPr sz="8000"/>
+              <a:defRPr sz="7680"/>
             </a:lvl1pPr>
           </a:lstStyle>
           <a:p>
@@ -168,8 +173,8 @@
         </p:nvSpPr>
         <p:spPr>
           <a:xfrm>
-            <a:off x="1524000" y="6243533"/>
-            <a:ext cx="9144000" cy="2869987"/>
+            <a:off x="1463080" y="6243533"/>
+            <a:ext cx="8778479" cy="2869987"/>
           </a:xfrm>
         </p:spPr>
         <p:txBody>
@@ -177,39 +182,39 @@
           <a:lstStyle>
             <a:lvl1pPr marL="0" indent="0" algn="ctr">
               <a:buNone/>
-              <a:defRPr sz="3200"/>
+              <a:defRPr sz="3072"/>
             </a:lvl1pPr>
-            <a:lvl2pPr marL="609585" indent="0" algn="ctr">
-              <a:buNone/>
-              <a:defRPr sz="2667"/>
+            <a:lvl2pPr marL="585216" indent="0" algn="ctr">
+              <a:buNone/>
+              <a:defRPr sz="2560"/>
             </a:lvl2pPr>
-            <a:lvl3pPr marL="1219170" indent="0" algn="ctr">
-              <a:buNone/>
-              <a:defRPr sz="2400"/>
+            <a:lvl3pPr marL="1170432" indent="0" algn="ctr">
+              <a:buNone/>
+              <a:defRPr sz="2304"/>
             </a:lvl3pPr>
-            <a:lvl4pPr marL="1828754" indent="0" algn="ctr">
-              <a:buNone/>
-              <a:defRPr sz="2133"/>
+            <a:lvl4pPr marL="1755648" indent="0" algn="ctr">
+              <a:buNone/>
+              <a:defRPr sz="2048"/>
             </a:lvl4pPr>
-            <a:lvl5pPr marL="2438339" indent="0" algn="ctr">
-              <a:buNone/>
-              <a:defRPr sz="2133"/>
+            <a:lvl5pPr marL="2340864" indent="0" algn="ctr">
+              <a:buNone/>
+              <a:defRPr sz="2048"/>
             </a:lvl5pPr>
-            <a:lvl6pPr marL="3047924" indent="0" algn="ctr">
-              <a:buNone/>
-              <a:defRPr sz="2133"/>
+            <a:lvl6pPr marL="2926080" indent="0" algn="ctr">
+              <a:buNone/>
+              <a:defRPr sz="2048"/>
             </a:lvl6pPr>
-            <a:lvl7pPr marL="3657509" indent="0" algn="ctr">
-              <a:buNone/>
-              <a:defRPr sz="2133"/>
+            <a:lvl7pPr marL="3511296" indent="0" algn="ctr">
+              <a:buNone/>
+              <a:defRPr sz="2048"/>
             </a:lvl7pPr>
-            <a:lvl8pPr marL="4267093" indent="0" algn="ctr">
-              <a:buNone/>
-              <a:defRPr sz="2133"/>
+            <a:lvl8pPr marL="4096512" indent="0" algn="ctr">
+              <a:buNone/>
+              <a:defRPr sz="2048"/>
             </a:lvl8pPr>
-            <a:lvl9pPr marL="4876678" indent="0" algn="ctr">
-              <a:buNone/>
-              <a:defRPr sz="2133"/>
+            <a:lvl9pPr marL="4681728" indent="0" algn="ctr">
+              <a:buNone/>
+              <a:defRPr sz="2048"/>
             </a:lvl9pPr>
           </a:lstStyle>
           <a:p>
@@ -238,7 +243,7 @@
           <a:p>
             <a:fld id="{98BCB455-7D98-FC48-A214-E034FB7C7D1F}" type="datetimeFigureOut">
               <a:rPr lang="en-US" smtClean="0"/>
-              <a:t>4/19/24</a:t>
+              <a:t>5/19/24</a:t>
             </a:fld>
             <a:endParaRPr lang="en-US"/>
           </a:p>
@@ -289,7 +294,7 @@
     </p:spTree>
     <p:extLst>
       <p:ext uri="{BB962C8B-B14F-4D97-AF65-F5344CB8AC3E}">
-        <p14:creationId xmlns:p14="http://schemas.microsoft.com/office/powerpoint/2010/main" val="3984963649"/>
+        <p14:creationId xmlns:p14="http://schemas.microsoft.com/office/powerpoint/2010/main" val="816775614"/>
       </p:ext>
     </p:extLst>
   </p:cSld>
@@ -408,7 +413,7 @@
           <a:p>
             <a:fld id="{98BCB455-7D98-FC48-A214-E034FB7C7D1F}" type="datetimeFigureOut">
               <a:rPr lang="en-US" smtClean="0"/>
-              <a:t>4/19/24</a:t>
+              <a:t>5/19/24</a:t>
             </a:fld>
             <a:endParaRPr lang="en-US"/>
           </a:p>
@@ -459,7 +464,7 @@
     </p:spTree>
     <p:extLst>
       <p:ext uri="{BB962C8B-B14F-4D97-AF65-F5344CB8AC3E}">
-        <p14:creationId xmlns:p14="http://schemas.microsoft.com/office/powerpoint/2010/main" val="2231423385"/>
+        <p14:creationId xmlns:p14="http://schemas.microsoft.com/office/powerpoint/2010/main" val="682481267"/>
       </p:ext>
     </p:extLst>
   </p:cSld>
@@ -498,8 +503,8 @@
         </p:nvSpPr>
         <p:spPr>
           <a:xfrm>
-            <a:off x="8724901" y="632883"/>
-            <a:ext cx="2628900" cy="10073853"/>
+            <a:off x="8376132" y="632883"/>
+            <a:ext cx="2523813" cy="10073853"/>
           </a:xfrm>
         </p:spPr>
         <p:txBody>
@@ -526,8 +531,8 @@
         </p:nvSpPr>
         <p:spPr>
           <a:xfrm>
-            <a:off x="838201" y="632883"/>
-            <a:ext cx="7734300" cy="10073853"/>
+            <a:off x="804694" y="632883"/>
+            <a:ext cx="7425130" cy="10073853"/>
           </a:xfrm>
         </p:spPr>
         <p:txBody>
@@ -588,7 +593,7 @@
           <a:p>
             <a:fld id="{98BCB455-7D98-FC48-A214-E034FB7C7D1F}" type="datetimeFigureOut">
               <a:rPr lang="en-US" smtClean="0"/>
-              <a:t>4/19/24</a:t>
+              <a:t>5/19/24</a:t>
             </a:fld>
             <a:endParaRPr lang="en-US"/>
           </a:p>
@@ -639,7 +644,7 @@
     </p:spTree>
     <p:extLst>
       <p:ext uri="{BB962C8B-B14F-4D97-AF65-F5344CB8AC3E}">
-        <p14:creationId xmlns:p14="http://schemas.microsoft.com/office/powerpoint/2010/main" val="3513042813"/>
+        <p14:creationId xmlns:p14="http://schemas.microsoft.com/office/powerpoint/2010/main" val="1512425706"/>
       </p:ext>
     </p:extLst>
   </p:cSld>
@@ -758,7 +763,7 @@
           <a:p>
             <a:fld id="{98BCB455-7D98-FC48-A214-E034FB7C7D1F}" type="datetimeFigureOut">
               <a:rPr lang="en-US" smtClean="0"/>
-              <a:t>4/19/24</a:t>
+              <a:t>5/19/24</a:t>
             </a:fld>
             <a:endParaRPr lang="en-US"/>
           </a:p>
@@ -809,7 +814,7 @@
     </p:spTree>
     <p:extLst>
       <p:ext uri="{BB962C8B-B14F-4D97-AF65-F5344CB8AC3E}">
-        <p14:creationId xmlns:p14="http://schemas.microsoft.com/office/powerpoint/2010/main" val="1162654717"/>
+        <p14:creationId xmlns:p14="http://schemas.microsoft.com/office/powerpoint/2010/main" val="1731737205"/>
       </p:ext>
     </p:extLst>
   </p:cSld>
@@ -848,15 +853,15 @@
         </p:nvSpPr>
         <p:spPr>
           <a:xfrm>
-            <a:off x="831851" y="2963549"/>
-            <a:ext cx="10515600" cy="4944744"/>
+            <a:off x="798598" y="2963549"/>
+            <a:ext cx="10095250" cy="4944744"/>
           </a:xfrm>
         </p:spPr>
         <p:txBody>
           <a:bodyPr anchor="b"/>
           <a:lstStyle>
             <a:lvl1pPr>
-              <a:defRPr sz="8000"/>
+              <a:defRPr sz="7680"/>
             </a:lvl1pPr>
           </a:lstStyle>
           <a:p>
@@ -880,8 +885,8 @@
         </p:nvSpPr>
         <p:spPr>
           <a:xfrm>
-            <a:off x="831851" y="7955072"/>
-            <a:ext cx="10515600" cy="2600324"/>
+            <a:off x="798598" y="7955072"/>
+            <a:ext cx="10095250" cy="2600324"/>
           </a:xfrm>
         </p:spPr>
         <p:txBody>
@@ -889,7 +894,7 @@
           <a:lstStyle>
             <a:lvl1pPr marL="0" indent="0">
               <a:buNone/>
-              <a:defRPr sz="3200">
+              <a:defRPr sz="3072">
                 <a:solidFill>
                   <a:schemeClr val="tx1">
                     <a:tint val="82000"/>
@@ -897,9 +902,9 @@
                 </a:solidFill>
               </a:defRPr>
             </a:lvl1pPr>
-            <a:lvl2pPr marL="609585" indent="0">
-              <a:buNone/>
-              <a:defRPr sz="2667">
+            <a:lvl2pPr marL="585216" indent="0">
+              <a:buNone/>
+              <a:defRPr sz="2560">
                 <a:solidFill>
                   <a:schemeClr val="tx1">
                     <a:tint val="82000"/>
@@ -907,9 +912,9 @@
                 </a:solidFill>
               </a:defRPr>
             </a:lvl2pPr>
-            <a:lvl3pPr marL="1219170" indent="0">
-              <a:buNone/>
-              <a:defRPr sz="2400">
+            <a:lvl3pPr marL="1170432" indent="0">
+              <a:buNone/>
+              <a:defRPr sz="2304">
                 <a:solidFill>
                   <a:schemeClr val="tx1">
                     <a:tint val="82000"/>
@@ -917,9 +922,9 @@
                 </a:solidFill>
               </a:defRPr>
             </a:lvl3pPr>
-            <a:lvl4pPr marL="1828754" indent="0">
-              <a:buNone/>
-              <a:defRPr sz="2133">
+            <a:lvl4pPr marL="1755648" indent="0">
+              <a:buNone/>
+              <a:defRPr sz="2048">
                 <a:solidFill>
                   <a:schemeClr val="tx1">
                     <a:tint val="82000"/>
@@ -927,9 +932,9 @@
                 </a:solidFill>
               </a:defRPr>
             </a:lvl4pPr>
-            <a:lvl5pPr marL="2438339" indent="0">
-              <a:buNone/>
-              <a:defRPr sz="2133">
+            <a:lvl5pPr marL="2340864" indent="0">
+              <a:buNone/>
+              <a:defRPr sz="2048">
                 <a:solidFill>
                   <a:schemeClr val="tx1">
                     <a:tint val="82000"/>
@@ -937,9 +942,9 @@
                 </a:solidFill>
               </a:defRPr>
             </a:lvl5pPr>
-            <a:lvl6pPr marL="3047924" indent="0">
-              <a:buNone/>
-              <a:defRPr sz="2133">
+            <a:lvl6pPr marL="2926080" indent="0">
+              <a:buNone/>
+              <a:defRPr sz="2048">
                 <a:solidFill>
                   <a:schemeClr val="tx1">
                     <a:tint val="82000"/>
@@ -947,9 +952,9 @@
                 </a:solidFill>
               </a:defRPr>
             </a:lvl6pPr>
-            <a:lvl7pPr marL="3657509" indent="0">
-              <a:buNone/>
-              <a:defRPr sz="2133">
+            <a:lvl7pPr marL="3511296" indent="0">
+              <a:buNone/>
+              <a:defRPr sz="2048">
                 <a:solidFill>
                   <a:schemeClr val="tx1">
                     <a:tint val="82000"/>
@@ -957,9 +962,9 @@
                 </a:solidFill>
               </a:defRPr>
             </a:lvl7pPr>
-            <a:lvl8pPr marL="4267093" indent="0">
-              <a:buNone/>
-              <a:defRPr sz="2133">
+            <a:lvl8pPr marL="4096512" indent="0">
+              <a:buNone/>
+              <a:defRPr sz="2048">
                 <a:solidFill>
                   <a:schemeClr val="tx1">
                     <a:tint val="82000"/>
@@ -967,9 +972,9 @@
                 </a:solidFill>
               </a:defRPr>
             </a:lvl8pPr>
-            <a:lvl9pPr marL="4876678" indent="0">
-              <a:buNone/>
-              <a:defRPr sz="2133">
+            <a:lvl9pPr marL="4681728" indent="0">
+              <a:buNone/>
+              <a:defRPr sz="2048">
                 <a:solidFill>
                   <a:schemeClr val="tx1">
                     <a:tint val="82000"/>
@@ -1004,7 +1009,7 @@
           <a:p>
             <a:fld id="{98BCB455-7D98-FC48-A214-E034FB7C7D1F}" type="datetimeFigureOut">
               <a:rPr lang="en-US" smtClean="0"/>
-              <a:t>4/19/24</a:t>
+              <a:t>5/19/24</a:t>
             </a:fld>
             <a:endParaRPr lang="en-US"/>
           </a:p>
@@ -1055,7 +1060,7 @@
     </p:spTree>
     <p:extLst>
       <p:ext uri="{BB962C8B-B14F-4D97-AF65-F5344CB8AC3E}">
-        <p14:creationId xmlns:p14="http://schemas.microsoft.com/office/powerpoint/2010/main" val="2619452518"/>
+        <p14:creationId xmlns:p14="http://schemas.microsoft.com/office/powerpoint/2010/main" val="1025007129"/>
       </p:ext>
     </p:extLst>
   </p:cSld>
@@ -1117,8 +1122,8 @@
         </p:nvSpPr>
         <p:spPr>
           <a:xfrm>
-            <a:off x="838200" y="3164417"/>
-            <a:ext cx="5181600" cy="7542319"/>
+            <a:off x="804694" y="3164417"/>
+            <a:ext cx="4974471" cy="7542319"/>
           </a:xfrm>
         </p:spPr>
         <p:txBody>
@@ -1174,8 +1179,8 @@
         </p:nvSpPr>
         <p:spPr>
           <a:xfrm>
-            <a:off x="6172200" y="3164417"/>
-            <a:ext cx="5181600" cy="7542319"/>
+            <a:off x="5925473" y="3164417"/>
+            <a:ext cx="4974471" cy="7542319"/>
           </a:xfrm>
         </p:spPr>
         <p:txBody>
@@ -1236,7 +1241,7 @@
           <a:p>
             <a:fld id="{98BCB455-7D98-FC48-A214-E034FB7C7D1F}" type="datetimeFigureOut">
               <a:rPr lang="en-US" smtClean="0"/>
-              <a:t>4/19/24</a:t>
+              <a:t>5/19/24</a:t>
             </a:fld>
             <a:endParaRPr lang="en-US"/>
           </a:p>
@@ -1287,7 +1292,7 @@
     </p:spTree>
     <p:extLst>
       <p:ext uri="{BB962C8B-B14F-4D97-AF65-F5344CB8AC3E}">
-        <p14:creationId xmlns:p14="http://schemas.microsoft.com/office/powerpoint/2010/main" val="4285558432"/>
+        <p14:creationId xmlns:p14="http://schemas.microsoft.com/office/powerpoint/2010/main" val="437725114"/>
       </p:ext>
     </p:extLst>
   </p:cSld>
@@ -1326,8 +1331,8 @@
         </p:nvSpPr>
         <p:spPr>
           <a:xfrm>
-            <a:off x="839788" y="632886"/>
-            <a:ext cx="10515600" cy="2297643"/>
+            <a:off x="806219" y="632886"/>
+            <a:ext cx="10095250" cy="2297643"/>
           </a:xfrm>
         </p:spPr>
         <p:txBody>
@@ -1354,8 +1359,8 @@
         </p:nvSpPr>
         <p:spPr>
           <a:xfrm>
-            <a:off x="839789" y="2914016"/>
-            <a:ext cx="5157787" cy="1428114"/>
+            <a:off x="806220" y="2914016"/>
+            <a:ext cx="4951610" cy="1428114"/>
           </a:xfrm>
         </p:spPr>
         <p:txBody>
@@ -1363,39 +1368,39 @@
           <a:lstStyle>
             <a:lvl1pPr marL="0" indent="0">
               <a:buNone/>
-              <a:defRPr sz="3200" b="1"/>
+              <a:defRPr sz="3072" b="1"/>
             </a:lvl1pPr>
-            <a:lvl2pPr marL="609585" indent="0">
-              <a:buNone/>
-              <a:defRPr sz="2667" b="1"/>
+            <a:lvl2pPr marL="585216" indent="0">
+              <a:buNone/>
+              <a:defRPr sz="2560" b="1"/>
             </a:lvl2pPr>
-            <a:lvl3pPr marL="1219170" indent="0">
-              <a:buNone/>
-              <a:defRPr sz="2400" b="1"/>
+            <a:lvl3pPr marL="1170432" indent="0">
+              <a:buNone/>
+              <a:defRPr sz="2304" b="1"/>
             </a:lvl3pPr>
-            <a:lvl4pPr marL="1828754" indent="0">
-              <a:buNone/>
-              <a:defRPr sz="2133" b="1"/>
+            <a:lvl4pPr marL="1755648" indent="0">
+              <a:buNone/>
+              <a:defRPr sz="2048" b="1"/>
             </a:lvl4pPr>
-            <a:lvl5pPr marL="2438339" indent="0">
-              <a:buNone/>
-              <a:defRPr sz="2133" b="1"/>
+            <a:lvl5pPr marL="2340864" indent="0">
+              <a:buNone/>
+              <a:defRPr sz="2048" b="1"/>
             </a:lvl5pPr>
-            <a:lvl6pPr marL="3047924" indent="0">
-              <a:buNone/>
-              <a:defRPr sz="2133" b="1"/>
+            <a:lvl6pPr marL="2926080" indent="0">
+              <a:buNone/>
+              <a:defRPr sz="2048" b="1"/>
             </a:lvl6pPr>
-            <a:lvl7pPr marL="3657509" indent="0">
-              <a:buNone/>
-              <a:defRPr sz="2133" b="1"/>
+            <a:lvl7pPr marL="3511296" indent="0">
+              <a:buNone/>
+              <a:defRPr sz="2048" b="1"/>
             </a:lvl7pPr>
-            <a:lvl8pPr marL="4267093" indent="0">
-              <a:buNone/>
-              <a:defRPr sz="2133" b="1"/>
+            <a:lvl8pPr marL="4096512" indent="0">
+              <a:buNone/>
+              <a:defRPr sz="2048" b="1"/>
             </a:lvl8pPr>
-            <a:lvl9pPr marL="4876678" indent="0">
-              <a:buNone/>
-              <a:defRPr sz="2133" b="1"/>
+            <a:lvl9pPr marL="4681728" indent="0">
+              <a:buNone/>
+              <a:defRPr sz="2048" b="1"/>
             </a:lvl9pPr>
           </a:lstStyle>
           <a:p>
@@ -1419,8 +1424,8 @@
         </p:nvSpPr>
         <p:spPr>
           <a:xfrm>
-            <a:off x="839789" y="4342130"/>
-            <a:ext cx="5157787" cy="6386619"/>
+            <a:off x="806220" y="4342130"/>
+            <a:ext cx="4951610" cy="6386619"/>
           </a:xfrm>
         </p:spPr>
         <p:txBody>
@@ -1476,8 +1481,8 @@
         </p:nvSpPr>
         <p:spPr>
           <a:xfrm>
-            <a:off x="6172201" y="2914016"/>
-            <a:ext cx="5183188" cy="1428114"/>
+            <a:off x="5925473" y="2914016"/>
+            <a:ext cx="4975996" cy="1428114"/>
           </a:xfrm>
         </p:spPr>
         <p:txBody>
@@ -1485,39 +1490,39 @@
           <a:lstStyle>
             <a:lvl1pPr marL="0" indent="0">
               <a:buNone/>
-              <a:defRPr sz="3200" b="1"/>
+              <a:defRPr sz="3072" b="1"/>
             </a:lvl1pPr>
-            <a:lvl2pPr marL="609585" indent="0">
-              <a:buNone/>
-              <a:defRPr sz="2667" b="1"/>
+            <a:lvl2pPr marL="585216" indent="0">
+              <a:buNone/>
+              <a:defRPr sz="2560" b="1"/>
             </a:lvl2pPr>
-            <a:lvl3pPr marL="1219170" indent="0">
-              <a:buNone/>
-              <a:defRPr sz="2400" b="1"/>
+            <a:lvl3pPr marL="1170432" indent="0">
+              <a:buNone/>
+              <a:defRPr sz="2304" b="1"/>
             </a:lvl3pPr>
-            <a:lvl4pPr marL="1828754" indent="0">
-              <a:buNone/>
-              <a:defRPr sz="2133" b="1"/>
+            <a:lvl4pPr marL="1755648" indent="0">
+              <a:buNone/>
+              <a:defRPr sz="2048" b="1"/>
             </a:lvl4pPr>
-            <a:lvl5pPr marL="2438339" indent="0">
-              <a:buNone/>
-              <a:defRPr sz="2133" b="1"/>
+            <a:lvl5pPr marL="2340864" indent="0">
+              <a:buNone/>
+              <a:defRPr sz="2048" b="1"/>
             </a:lvl5pPr>
-            <a:lvl6pPr marL="3047924" indent="0">
-              <a:buNone/>
-              <a:defRPr sz="2133" b="1"/>
+            <a:lvl6pPr marL="2926080" indent="0">
+              <a:buNone/>
+              <a:defRPr sz="2048" b="1"/>
             </a:lvl6pPr>
-            <a:lvl7pPr marL="3657509" indent="0">
-              <a:buNone/>
-              <a:defRPr sz="2133" b="1"/>
+            <a:lvl7pPr marL="3511296" indent="0">
+              <a:buNone/>
+              <a:defRPr sz="2048" b="1"/>
             </a:lvl7pPr>
-            <a:lvl8pPr marL="4267093" indent="0">
-              <a:buNone/>
-              <a:defRPr sz="2133" b="1"/>
+            <a:lvl8pPr marL="4096512" indent="0">
+              <a:buNone/>
+              <a:defRPr sz="2048" b="1"/>
             </a:lvl8pPr>
-            <a:lvl9pPr marL="4876678" indent="0">
-              <a:buNone/>
-              <a:defRPr sz="2133" b="1"/>
+            <a:lvl9pPr marL="4681728" indent="0">
+              <a:buNone/>
+              <a:defRPr sz="2048" b="1"/>
             </a:lvl9pPr>
           </a:lstStyle>
           <a:p>
@@ -1541,8 +1546,8 @@
         </p:nvSpPr>
         <p:spPr>
           <a:xfrm>
-            <a:off x="6172201" y="4342130"/>
-            <a:ext cx="5183188" cy="6386619"/>
+            <a:off x="5925473" y="4342130"/>
+            <a:ext cx="4975996" cy="6386619"/>
           </a:xfrm>
         </p:spPr>
         <p:txBody>
@@ -1603,7 +1608,7 @@
           <a:p>
             <a:fld id="{98BCB455-7D98-FC48-A214-E034FB7C7D1F}" type="datetimeFigureOut">
               <a:rPr lang="en-US" smtClean="0"/>
-              <a:t>4/19/24</a:t>
+              <a:t>5/19/24</a:t>
             </a:fld>
             <a:endParaRPr lang="en-US"/>
           </a:p>
@@ -1654,7 +1659,7 @@
     </p:spTree>
     <p:extLst>
       <p:ext uri="{BB962C8B-B14F-4D97-AF65-F5344CB8AC3E}">
-        <p14:creationId xmlns:p14="http://schemas.microsoft.com/office/powerpoint/2010/main" val="3952839229"/>
+        <p14:creationId xmlns:p14="http://schemas.microsoft.com/office/powerpoint/2010/main" val="845320894"/>
       </p:ext>
     </p:extLst>
   </p:cSld>
@@ -1721,7 +1726,7 @@
           <a:p>
             <a:fld id="{98BCB455-7D98-FC48-A214-E034FB7C7D1F}" type="datetimeFigureOut">
               <a:rPr lang="en-US" smtClean="0"/>
-              <a:t>4/19/24</a:t>
+              <a:t>5/19/24</a:t>
             </a:fld>
             <a:endParaRPr lang="en-US"/>
           </a:p>
@@ -1772,7 +1777,7 @@
     </p:spTree>
     <p:extLst>
       <p:ext uri="{BB962C8B-B14F-4D97-AF65-F5344CB8AC3E}">
-        <p14:creationId xmlns:p14="http://schemas.microsoft.com/office/powerpoint/2010/main" val="4142860560"/>
+        <p14:creationId xmlns:p14="http://schemas.microsoft.com/office/powerpoint/2010/main" val="4473144"/>
       </p:ext>
     </p:extLst>
   </p:cSld>
@@ -1816,7 +1821,7 @@
           <a:p>
             <a:fld id="{98BCB455-7D98-FC48-A214-E034FB7C7D1F}" type="datetimeFigureOut">
               <a:rPr lang="en-US" smtClean="0"/>
-              <a:t>4/19/24</a:t>
+              <a:t>5/19/24</a:t>
             </a:fld>
             <a:endParaRPr lang="en-US"/>
           </a:p>
@@ -1867,7 +1872,7 @@
     </p:spTree>
     <p:extLst>
       <p:ext uri="{BB962C8B-B14F-4D97-AF65-F5344CB8AC3E}">
-        <p14:creationId xmlns:p14="http://schemas.microsoft.com/office/powerpoint/2010/main" val="2694583285"/>
+        <p14:creationId xmlns:p14="http://schemas.microsoft.com/office/powerpoint/2010/main" val="124532937"/>
       </p:ext>
     </p:extLst>
   </p:cSld>
@@ -1906,15 +1911,15 @@
         </p:nvSpPr>
         <p:spPr>
           <a:xfrm>
-            <a:off x="839788" y="792480"/>
-            <a:ext cx="3932237" cy="2773680"/>
+            <a:off x="806219" y="792480"/>
+            <a:ext cx="3775050" cy="2773680"/>
           </a:xfrm>
         </p:spPr>
         <p:txBody>
           <a:bodyPr anchor="b"/>
           <a:lstStyle>
             <a:lvl1pPr>
-              <a:defRPr sz="4267"/>
+              <a:defRPr sz="4096"/>
             </a:lvl1pPr>
           </a:lstStyle>
           <a:p>
@@ -1938,39 +1943,39 @@
         </p:nvSpPr>
         <p:spPr>
           <a:xfrm>
-            <a:off x="5183188" y="1711539"/>
-            <a:ext cx="6172200" cy="8447617"/>
+            <a:off x="4975996" y="1711539"/>
+            <a:ext cx="5925473" cy="8447617"/>
           </a:xfrm>
         </p:spPr>
         <p:txBody>
           <a:bodyPr/>
           <a:lstStyle>
             <a:lvl1pPr>
-              <a:defRPr sz="4267"/>
+              <a:defRPr sz="4096"/>
             </a:lvl1pPr>
             <a:lvl2pPr>
-              <a:defRPr sz="3733"/>
+              <a:defRPr sz="3584"/>
             </a:lvl2pPr>
             <a:lvl3pPr>
-              <a:defRPr sz="3200"/>
+              <a:defRPr sz="3072"/>
             </a:lvl3pPr>
             <a:lvl4pPr>
-              <a:defRPr sz="2667"/>
+              <a:defRPr sz="2560"/>
             </a:lvl4pPr>
             <a:lvl5pPr>
-              <a:defRPr sz="2667"/>
+              <a:defRPr sz="2560"/>
             </a:lvl5pPr>
             <a:lvl6pPr>
-              <a:defRPr sz="2667"/>
+              <a:defRPr sz="2560"/>
             </a:lvl6pPr>
             <a:lvl7pPr>
-              <a:defRPr sz="2667"/>
+              <a:defRPr sz="2560"/>
             </a:lvl7pPr>
             <a:lvl8pPr>
-              <a:defRPr sz="2667"/>
+              <a:defRPr sz="2560"/>
             </a:lvl8pPr>
             <a:lvl9pPr>
-              <a:defRPr sz="2667"/>
+              <a:defRPr sz="2560"/>
             </a:lvl9pPr>
           </a:lstStyle>
           <a:p>
@@ -2023,8 +2028,8 @@
         </p:nvSpPr>
         <p:spPr>
           <a:xfrm>
-            <a:off x="839788" y="3566160"/>
-            <a:ext cx="3932237" cy="6606753"/>
+            <a:off x="806219" y="3566160"/>
+            <a:ext cx="3775050" cy="6606753"/>
           </a:xfrm>
         </p:spPr>
         <p:txBody>
@@ -2032,39 +2037,39 @@
           <a:lstStyle>
             <a:lvl1pPr marL="0" indent="0">
               <a:buNone/>
-              <a:defRPr sz="2133"/>
+              <a:defRPr sz="2048"/>
             </a:lvl1pPr>
-            <a:lvl2pPr marL="609585" indent="0">
-              <a:buNone/>
-              <a:defRPr sz="1867"/>
+            <a:lvl2pPr marL="585216" indent="0">
+              <a:buNone/>
+              <a:defRPr sz="1792"/>
             </a:lvl2pPr>
-            <a:lvl3pPr marL="1219170" indent="0">
-              <a:buNone/>
-              <a:defRPr sz="1600"/>
+            <a:lvl3pPr marL="1170432" indent="0">
+              <a:buNone/>
+              <a:defRPr sz="1536"/>
             </a:lvl3pPr>
-            <a:lvl4pPr marL="1828754" indent="0">
-              <a:buNone/>
-              <a:defRPr sz="1333"/>
+            <a:lvl4pPr marL="1755648" indent="0">
+              <a:buNone/>
+              <a:defRPr sz="1280"/>
             </a:lvl4pPr>
-            <a:lvl5pPr marL="2438339" indent="0">
-              <a:buNone/>
-              <a:defRPr sz="1333"/>
+            <a:lvl5pPr marL="2340864" indent="0">
+              <a:buNone/>
+              <a:defRPr sz="1280"/>
             </a:lvl5pPr>
-            <a:lvl6pPr marL="3047924" indent="0">
-              <a:buNone/>
-              <a:defRPr sz="1333"/>
+            <a:lvl6pPr marL="2926080" indent="0">
+              <a:buNone/>
+              <a:defRPr sz="1280"/>
             </a:lvl6pPr>
-            <a:lvl7pPr marL="3657509" indent="0">
-              <a:buNone/>
-              <a:defRPr sz="1333"/>
+            <a:lvl7pPr marL="3511296" indent="0">
+              <a:buNone/>
+              <a:defRPr sz="1280"/>
             </a:lvl7pPr>
-            <a:lvl8pPr marL="4267093" indent="0">
-              <a:buNone/>
-              <a:defRPr sz="1333"/>
+            <a:lvl8pPr marL="4096512" indent="0">
+              <a:buNone/>
+              <a:defRPr sz="1280"/>
             </a:lvl8pPr>
-            <a:lvl9pPr marL="4876678" indent="0">
-              <a:buNone/>
-              <a:defRPr sz="1333"/>
+            <a:lvl9pPr marL="4681728" indent="0">
+              <a:buNone/>
+              <a:defRPr sz="1280"/>
             </a:lvl9pPr>
           </a:lstStyle>
           <a:p>
@@ -2093,7 +2098,7 @@
           <a:p>
             <a:fld id="{98BCB455-7D98-FC48-A214-E034FB7C7D1F}" type="datetimeFigureOut">
               <a:rPr lang="en-US" smtClean="0"/>
-              <a:t>4/19/24</a:t>
+              <a:t>5/19/24</a:t>
             </a:fld>
             <a:endParaRPr lang="en-US"/>
           </a:p>
@@ -2144,7 +2149,7 @@
     </p:spTree>
     <p:extLst>
       <p:ext uri="{BB962C8B-B14F-4D97-AF65-F5344CB8AC3E}">
-        <p14:creationId xmlns:p14="http://schemas.microsoft.com/office/powerpoint/2010/main" val="1468703386"/>
+        <p14:creationId xmlns:p14="http://schemas.microsoft.com/office/powerpoint/2010/main" val="267138227"/>
       </p:ext>
     </p:extLst>
   </p:cSld>
@@ -2183,15 +2188,15 @@
         </p:nvSpPr>
         <p:spPr>
           <a:xfrm>
-            <a:off x="839788" y="792480"/>
-            <a:ext cx="3932237" cy="2773680"/>
+            <a:off x="806219" y="792480"/>
+            <a:ext cx="3775050" cy="2773680"/>
           </a:xfrm>
         </p:spPr>
         <p:txBody>
           <a:bodyPr anchor="b"/>
           <a:lstStyle>
             <a:lvl1pPr>
-              <a:defRPr sz="4267"/>
+              <a:defRPr sz="4096"/>
             </a:lvl1pPr>
           </a:lstStyle>
           <a:p>
@@ -2215,8 +2220,8 @@
         </p:nvSpPr>
         <p:spPr>
           <a:xfrm>
-            <a:off x="5183188" y="1711539"/>
-            <a:ext cx="6172200" cy="8447617"/>
+            <a:off x="4975996" y="1711539"/>
+            <a:ext cx="5925473" cy="8447617"/>
           </a:xfrm>
         </p:spPr>
         <p:txBody>
@@ -2224,39 +2229,39 @@
           <a:lstStyle>
             <a:lvl1pPr marL="0" indent="0">
               <a:buNone/>
-              <a:defRPr sz="4267"/>
+              <a:defRPr sz="4096"/>
             </a:lvl1pPr>
-            <a:lvl2pPr marL="609585" indent="0">
-              <a:buNone/>
-              <a:defRPr sz="3733"/>
+            <a:lvl2pPr marL="585216" indent="0">
+              <a:buNone/>
+              <a:defRPr sz="3584"/>
             </a:lvl2pPr>
-            <a:lvl3pPr marL="1219170" indent="0">
-              <a:buNone/>
-              <a:defRPr sz="3200"/>
+            <a:lvl3pPr marL="1170432" indent="0">
+              <a:buNone/>
+              <a:defRPr sz="3072"/>
             </a:lvl3pPr>
-            <a:lvl4pPr marL="1828754" indent="0">
-              <a:buNone/>
-              <a:defRPr sz="2667"/>
+            <a:lvl4pPr marL="1755648" indent="0">
+              <a:buNone/>
+              <a:defRPr sz="2560"/>
             </a:lvl4pPr>
-            <a:lvl5pPr marL="2438339" indent="0">
-              <a:buNone/>
-              <a:defRPr sz="2667"/>
+            <a:lvl5pPr marL="2340864" indent="0">
+              <a:buNone/>
+              <a:defRPr sz="2560"/>
             </a:lvl5pPr>
-            <a:lvl6pPr marL="3047924" indent="0">
-              <a:buNone/>
-              <a:defRPr sz="2667"/>
+            <a:lvl6pPr marL="2926080" indent="0">
+              <a:buNone/>
+              <a:defRPr sz="2560"/>
             </a:lvl6pPr>
-            <a:lvl7pPr marL="3657509" indent="0">
-              <a:buNone/>
-              <a:defRPr sz="2667"/>
+            <a:lvl7pPr marL="3511296" indent="0">
+              <a:buNone/>
+              <a:defRPr sz="2560"/>
             </a:lvl7pPr>
-            <a:lvl8pPr marL="4267093" indent="0">
-              <a:buNone/>
-              <a:defRPr sz="2667"/>
+            <a:lvl8pPr marL="4096512" indent="0">
+              <a:buNone/>
+              <a:defRPr sz="2560"/>
             </a:lvl8pPr>
-            <a:lvl9pPr marL="4876678" indent="0">
-              <a:buNone/>
-              <a:defRPr sz="2667"/>
+            <a:lvl9pPr marL="4681728" indent="0">
+              <a:buNone/>
+              <a:defRPr sz="2560"/>
             </a:lvl9pPr>
           </a:lstStyle>
           <a:p>
@@ -2280,8 +2285,8 @@
         </p:nvSpPr>
         <p:spPr>
           <a:xfrm>
-            <a:off x="839788" y="3566160"/>
-            <a:ext cx="3932237" cy="6606753"/>
+            <a:off x="806219" y="3566160"/>
+            <a:ext cx="3775050" cy="6606753"/>
           </a:xfrm>
         </p:spPr>
         <p:txBody>
@@ -2289,39 +2294,39 @@
           <a:lstStyle>
             <a:lvl1pPr marL="0" indent="0">
               <a:buNone/>
-              <a:defRPr sz="2133"/>
+              <a:defRPr sz="2048"/>
             </a:lvl1pPr>
-            <a:lvl2pPr marL="609585" indent="0">
-              <a:buNone/>
-              <a:defRPr sz="1867"/>
+            <a:lvl2pPr marL="585216" indent="0">
+              <a:buNone/>
+              <a:defRPr sz="1792"/>
             </a:lvl2pPr>
-            <a:lvl3pPr marL="1219170" indent="0">
-              <a:buNone/>
-              <a:defRPr sz="1600"/>
+            <a:lvl3pPr marL="1170432" indent="0">
+              <a:buNone/>
+              <a:defRPr sz="1536"/>
             </a:lvl3pPr>
-            <a:lvl4pPr marL="1828754" indent="0">
-              <a:buNone/>
-              <a:defRPr sz="1333"/>
+            <a:lvl4pPr marL="1755648" indent="0">
+              <a:buNone/>
+              <a:defRPr sz="1280"/>
             </a:lvl4pPr>
-            <a:lvl5pPr marL="2438339" indent="0">
-              <a:buNone/>
-              <a:defRPr sz="1333"/>
+            <a:lvl5pPr marL="2340864" indent="0">
+              <a:buNone/>
+              <a:defRPr sz="1280"/>
             </a:lvl5pPr>
-            <a:lvl6pPr marL="3047924" indent="0">
-              <a:buNone/>
-              <a:defRPr sz="1333"/>
+            <a:lvl6pPr marL="2926080" indent="0">
+              <a:buNone/>
+              <a:defRPr sz="1280"/>
             </a:lvl6pPr>
-            <a:lvl7pPr marL="3657509" indent="0">
-              <a:buNone/>
-              <a:defRPr sz="1333"/>
+            <a:lvl7pPr marL="3511296" indent="0">
+              <a:buNone/>
+              <a:defRPr sz="1280"/>
             </a:lvl7pPr>
-            <a:lvl8pPr marL="4267093" indent="0">
-              <a:buNone/>
-              <a:defRPr sz="1333"/>
+            <a:lvl8pPr marL="4096512" indent="0">
+              <a:buNone/>
+              <a:defRPr sz="1280"/>
             </a:lvl8pPr>
-            <a:lvl9pPr marL="4876678" indent="0">
-              <a:buNone/>
-              <a:defRPr sz="1333"/>
+            <a:lvl9pPr marL="4681728" indent="0">
+              <a:buNone/>
+              <a:defRPr sz="1280"/>
             </a:lvl9pPr>
           </a:lstStyle>
           <a:p>
@@ -2350,7 +2355,7 @@
           <a:p>
             <a:fld id="{98BCB455-7D98-FC48-A214-E034FB7C7D1F}" type="datetimeFigureOut">
               <a:rPr lang="en-US" smtClean="0"/>
-              <a:t>4/19/24</a:t>
+              <a:t>5/19/24</a:t>
             </a:fld>
             <a:endParaRPr lang="en-US"/>
           </a:p>
@@ -2401,7 +2406,7 @@
     </p:spTree>
     <p:extLst>
       <p:ext uri="{BB962C8B-B14F-4D97-AF65-F5344CB8AC3E}">
-        <p14:creationId xmlns:p14="http://schemas.microsoft.com/office/powerpoint/2010/main" val="202445468"/>
+        <p14:creationId xmlns:p14="http://schemas.microsoft.com/office/powerpoint/2010/main" val="2131941554"/>
       </p:ext>
     </p:extLst>
   </p:cSld>
@@ -2445,8 +2450,8 @@
         </p:nvSpPr>
         <p:spPr>
           <a:xfrm>
-            <a:off x="838200" y="632886"/>
-            <a:ext cx="10515600" cy="2297643"/>
+            <a:off x="804694" y="632886"/>
+            <a:ext cx="10095250" cy="2297643"/>
           </a:xfrm>
           <a:prstGeom prst="rect">
             <a:avLst/>
@@ -2478,8 +2483,8 @@
         </p:nvSpPr>
         <p:spPr>
           <a:xfrm>
-            <a:off x="838200" y="3164417"/>
-            <a:ext cx="10515600" cy="7542319"/>
+            <a:off x="804694" y="3164417"/>
+            <a:ext cx="10095250" cy="7542319"/>
           </a:xfrm>
           <a:prstGeom prst="rect">
             <a:avLst/>
@@ -2540,8 +2545,8 @@
         </p:nvSpPr>
         <p:spPr>
           <a:xfrm>
-            <a:off x="838200" y="11017676"/>
-            <a:ext cx="2743200" cy="632883"/>
+            <a:off x="804694" y="11017676"/>
+            <a:ext cx="2633544" cy="632883"/>
           </a:xfrm>
           <a:prstGeom prst="rect">
             <a:avLst/>
@@ -2551,7 +2556,7 @@
           <a:bodyPr vert="horz" lIns="91440" tIns="45720" rIns="91440" bIns="45720" rtlCol="0" anchor="ctr"/>
           <a:lstStyle>
             <a:lvl1pPr algn="l">
-              <a:defRPr sz="1600">
+              <a:defRPr sz="1536">
                 <a:solidFill>
                   <a:schemeClr val="tx1">
                     <a:tint val="82000"/>
@@ -2563,7 +2568,7 @@
           <a:p>
             <a:fld id="{98BCB455-7D98-FC48-A214-E034FB7C7D1F}" type="datetimeFigureOut">
               <a:rPr lang="en-US" smtClean="0"/>
-              <a:t>4/19/24</a:t>
+              <a:t>5/19/24</a:t>
             </a:fld>
             <a:endParaRPr lang="en-US"/>
           </a:p>
@@ -2581,8 +2586,8 @@
         </p:nvSpPr>
         <p:spPr>
           <a:xfrm>
-            <a:off x="4038600" y="11017676"/>
-            <a:ext cx="4114800" cy="632883"/>
+            <a:off x="3877162" y="11017676"/>
+            <a:ext cx="3950315" cy="632883"/>
           </a:xfrm>
           <a:prstGeom prst="rect">
             <a:avLst/>
@@ -2592,7 +2597,7 @@
           <a:bodyPr vert="horz" lIns="91440" tIns="45720" rIns="91440" bIns="45720" rtlCol="0" anchor="ctr"/>
           <a:lstStyle>
             <a:lvl1pPr algn="ctr">
-              <a:defRPr sz="1600">
+              <a:defRPr sz="1536">
                 <a:solidFill>
                   <a:schemeClr val="tx1">
                     <a:tint val="82000"/>
@@ -2618,8 +2623,8 @@
         </p:nvSpPr>
         <p:spPr>
           <a:xfrm>
-            <a:off x="8610600" y="11017676"/>
-            <a:ext cx="2743200" cy="632883"/>
+            <a:off x="8266400" y="11017676"/>
+            <a:ext cx="2633544" cy="632883"/>
           </a:xfrm>
           <a:prstGeom prst="rect">
             <a:avLst/>
@@ -2629,7 +2634,7 @@
           <a:bodyPr vert="horz" lIns="91440" tIns="45720" rIns="91440" bIns="45720" rtlCol="0" anchor="ctr"/>
           <a:lstStyle>
             <a:lvl1pPr algn="r">
-              <a:defRPr sz="1600">
+              <a:defRPr sz="1536">
                 <a:solidFill>
                   <a:schemeClr val="tx1">
                     <a:tint val="82000"/>
@@ -2650,27 +2655,27 @@
     </p:spTree>
     <p:extLst>
       <p:ext uri="{BB962C8B-B14F-4D97-AF65-F5344CB8AC3E}">
-        <p14:creationId xmlns:p14="http://schemas.microsoft.com/office/powerpoint/2010/main" val="248607631"/>
+        <p14:creationId xmlns:p14="http://schemas.microsoft.com/office/powerpoint/2010/main" val="1506740275"/>
       </p:ext>
     </p:extLst>
   </p:cSld>
   <p:clrMap bg1="lt1" tx1="dk1" bg2="lt2" tx2="dk2" accent1="accent1" accent2="accent2" accent3="accent3" accent4="accent4" accent5="accent5" accent6="accent6" hlink="hlink" folHlink="folHlink"/>
   <p:sldLayoutIdLst>
-    <p:sldLayoutId id="2147483661" r:id="rId1"/>
-    <p:sldLayoutId id="2147483662" r:id="rId2"/>
-    <p:sldLayoutId id="2147483663" r:id="rId3"/>
-    <p:sldLayoutId id="2147483664" r:id="rId4"/>
-    <p:sldLayoutId id="2147483665" r:id="rId5"/>
-    <p:sldLayoutId id="2147483666" r:id="rId6"/>
-    <p:sldLayoutId id="2147483667" r:id="rId7"/>
-    <p:sldLayoutId id="2147483668" r:id="rId8"/>
-    <p:sldLayoutId id="2147483669" r:id="rId9"/>
-    <p:sldLayoutId id="2147483670" r:id="rId10"/>
-    <p:sldLayoutId id="2147483671" r:id="rId11"/>
+    <p:sldLayoutId id="2147483673" r:id="rId1"/>
+    <p:sldLayoutId id="2147483674" r:id="rId2"/>
+    <p:sldLayoutId id="2147483675" r:id="rId3"/>
+    <p:sldLayoutId id="2147483676" r:id="rId4"/>
+    <p:sldLayoutId id="2147483677" r:id="rId5"/>
+    <p:sldLayoutId id="2147483678" r:id="rId6"/>
+    <p:sldLayoutId id="2147483679" r:id="rId7"/>
+    <p:sldLayoutId id="2147483680" r:id="rId8"/>
+    <p:sldLayoutId id="2147483681" r:id="rId9"/>
+    <p:sldLayoutId id="2147483682" r:id="rId10"/>
+    <p:sldLayoutId id="2147483683" r:id="rId11"/>
   </p:sldLayoutIdLst>
   <p:txStyles>
     <p:titleStyle>
-      <a:lvl1pPr algn="l" defTabSz="1219170" rtl="0" eaLnBrk="1" latinLnBrk="0" hangingPunct="1">
+      <a:lvl1pPr algn="l" defTabSz="1170432" rtl="0" eaLnBrk="1" latinLnBrk="0" hangingPunct="1">
         <a:lnSpc>
           <a:spcPct val="90000"/>
         </a:lnSpc>
@@ -2678,7 +2683,7 @@
           <a:spcPct val="0"/>
         </a:spcBef>
         <a:buNone/>
-        <a:defRPr sz="5867" kern="1200">
+        <a:defRPr sz="5632" kern="1200">
           <a:solidFill>
             <a:schemeClr val="tx1"/>
           </a:solidFill>
@@ -2689,16 +2694,16 @@
       </a:lvl1pPr>
     </p:titleStyle>
     <p:bodyStyle>
-      <a:lvl1pPr marL="304792" indent="-304792" algn="l" defTabSz="1219170" rtl="0" eaLnBrk="1" latinLnBrk="0" hangingPunct="1">
+      <a:lvl1pPr marL="292608" indent="-292608" algn="l" defTabSz="1170432" rtl="0" eaLnBrk="1" latinLnBrk="0" hangingPunct="1">
         <a:lnSpc>
           <a:spcPct val="90000"/>
         </a:lnSpc>
         <a:spcBef>
-          <a:spcPts val="1333"/>
+          <a:spcPts val="1280"/>
         </a:spcBef>
         <a:buFont typeface="Arial" panose="020B0604020202020204" pitchFamily="34" charset="0"/>
         <a:buChar char="•"/>
-        <a:defRPr sz="3733" kern="1200">
+        <a:defRPr sz="3584" kern="1200">
           <a:solidFill>
             <a:schemeClr val="tx1"/>
           </a:solidFill>
@@ -2707,16 +2712,16 @@
           <a:cs typeface="+mn-cs"/>
         </a:defRPr>
       </a:lvl1pPr>
-      <a:lvl2pPr marL="914377" indent="-304792" algn="l" defTabSz="1219170" rtl="0" eaLnBrk="1" latinLnBrk="0" hangingPunct="1">
+      <a:lvl2pPr marL="877824" indent="-292608" algn="l" defTabSz="1170432" rtl="0" eaLnBrk="1" latinLnBrk="0" hangingPunct="1">
         <a:lnSpc>
           <a:spcPct val="90000"/>
         </a:lnSpc>
         <a:spcBef>
-          <a:spcPts val="667"/>
+          <a:spcPts val="640"/>
         </a:spcBef>
         <a:buFont typeface="Arial" panose="020B0604020202020204" pitchFamily="34" charset="0"/>
         <a:buChar char="•"/>
-        <a:defRPr sz="3200" kern="1200">
+        <a:defRPr sz="3072" kern="1200">
           <a:solidFill>
             <a:schemeClr val="tx1"/>
           </a:solidFill>
@@ -2725,16 +2730,16 @@
           <a:cs typeface="+mn-cs"/>
         </a:defRPr>
       </a:lvl2pPr>
-      <a:lvl3pPr marL="1523962" indent="-304792" algn="l" defTabSz="1219170" rtl="0" eaLnBrk="1" latinLnBrk="0" hangingPunct="1">
+      <a:lvl3pPr marL="1463040" indent="-292608" algn="l" defTabSz="1170432" rtl="0" eaLnBrk="1" latinLnBrk="0" hangingPunct="1">
         <a:lnSpc>
           <a:spcPct val="90000"/>
         </a:lnSpc>
         <a:spcBef>
-          <a:spcPts val="667"/>
+          <a:spcPts val="640"/>
         </a:spcBef>
         <a:buFont typeface="Arial" panose="020B0604020202020204" pitchFamily="34" charset="0"/>
         <a:buChar char="•"/>
-        <a:defRPr sz="2667" kern="1200">
+        <a:defRPr sz="2560" kern="1200">
           <a:solidFill>
             <a:schemeClr val="tx1"/>
           </a:solidFill>
@@ -2743,16 +2748,16 @@
           <a:cs typeface="+mn-cs"/>
         </a:defRPr>
       </a:lvl3pPr>
-      <a:lvl4pPr marL="2133547" indent="-304792" algn="l" defTabSz="1219170" rtl="0" eaLnBrk="1" latinLnBrk="0" hangingPunct="1">
+      <a:lvl4pPr marL="2048256" indent="-292608" algn="l" defTabSz="1170432" rtl="0" eaLnBrk="1" latinLnBrk="0" hangingPunct="1">
         <a:lnSpc>
           <a:spcPct val="90000"/>
         </a:lnSpc>
         <a:spcBef>
-          <a:spcPts val="667"/>
+          <a:spcPts val="640"/>
         </a:spcBef>
         <a:buFont typeface="Arial" panose="020B0604020202020204" pitchFamily="34" charset="0"/>
         <a:buChar char="•"/>
-        <a:defRPr sz="2400" kern="1200">
+        <a:defRPr sz="2304" kern="1200">
           <a:solidFill>
             <a:schemeClr val="tx1"/>
           </a:solidFill>
@@ -2761,16 +2766,16 @@
           <a:cs typeface="+mn-cs"/>
         </a:defRPr>
       </a:lvl4pPr>
-      <a:lvl5pPr marL="2743131" indent="-304792" algn="l" defTabSz="1219170" rtl="0" eaLnBrk="1" latinLnBrk="0" hangingPunct="1">
+      <a:lvl5pPr marL="2633472" indent="-292608" algn="l" defTabSz="1170432" rtl="0" eaLnBrk="1" latinLnBrk="0" hangingPunct="1">
         <a:lnSpc>
           <a:spcPct val="90000"/>
         </a:lnSpc>
         <a:spcBef>
-          <a:spcPts val="667"/>
+          <a:spcPts val="640"/>
         </a:spcBef>
         <a:buFont typeface="Arial" panose="020B0604020202020204" pitchFamily="34" charset="0"/>
         <a:buChar char="•"/>
-        <a:defRPr sz="2400" kern="1200">
+        <a:defRPr sz="2304" kern="1200">
           <a:solidFill>
             <a:schemeClr val="tx1"/>
           </a:solidFill>
@@ -2779,16 +2784,16 @@
           <a:cs typeface="+mn-cs"/>
         </a:defRPr>
       </a:lvl5pPr>
-      <a:lvl6pPr marL="3352716" indent="-304792" algn="l" defTabSz="1219170" rtl="0" eaLnBrk="1" latinLnBrk="0" hangingPunct="1">
+      <a:lvl6pPr marL="3218688" indent="-292608" algn="l" defTabSz="1170432" rtl="0" eaLnBrk="1" latinLnBrk="0" hangingPunct="1">
         <a:lnSpc>
           <a:spcPct val="90000"/>
         </a:lnSpc>
         <a:spcBef>
-          <a:spcPts val="667"/>
+          <a:spcPts val="640"/>
         </a:spcBef>
         <a:buFont typeface="Arial" panose="020B0604020202020204" pitchFamily="34" charset="0"/>
         <a:buChar char="•"/>
-        <a:defRPr sz="2400" kern="1200">
+        <a:defRPr sz="2304" kern="1200">
           <a:solidFill>
             <a:schemeClr val="tx1"/>
           </a:solidFill>
@@ -2797,16 +2802,16 @@
           <a:cs typeface="+mn-cs"/>
         </a:defRPr>
       </a:lvl6pPr>
-      <a:lvl7pPr marL="3962301" indent="-304792" algn="l" defTabSz="1219170" rtl="0" eaLnBrk="1" latinLnBrk="0" hangingPunct="1">
+      <a:lvl7pPr marL="3803904" indent="-292608" algn="l" defTabSz="1170432" rtl="0" eaLnBrk="1" latinLnBrk="0" hangingPunct="1">
         <a:lnSpc>
           <a:spcPct val="90000"/>
         </a:lnSpc>
         <a:spcBef>
-          <a:spcPts val="667"/>
+          <a:spcPts val="640"/>
         </a:spcBef>
         <a:buFont typeface="Arial" panose="020B0604020202020204" pitchFamily="34" charset="0"/>
         <a:buChar char="•"/>
-        <a:defRPr sz="2400" kern="1200">
+        <a:defRPr sz="2304" kern="1200">
           <a:solidFill>
             <a:schemeClr val="tx1"/>
           </a:solidFill>
@@ -2815,16 +2820,16 @@
           <a:cs typeface="+mn-cs"/>
         </a:defRPr>
       </a:lvl7pPr>
-      <a:lvl8pPr marL="4571886" indent="-304792" algn="l" defTabSz="1219170" rtl="0" eaLnBrk="1" latinLnBrk="0" hangingPunct="1">
+      <a:lvl8pPr marL="4389120" indent="-292608" algn="l" defTabSz="1170432" rtl="0" eaLnBrk="1" latinLnBrk="0" hangingPunct="1">
         <a:lnSpc>
           <a:spcPct val="90000"/>
         </a:lnSpc>
         <a:spcBef>
-          <a:spcPts val="667"/>
+          <a:spcPts val="640"/>
         </a:spcBef>
         <a:buFont typeface="Arial" panose="020B0604020202020204" pitchFamily="34" charset="0"/>
         <a:buChar char="•"/>
-        <a:defRPr sz="2400" kern="1200">
+        <a:defRPr sz="2304" kern="1200">
           <a:solidFill>
             <a:schemeClr val="tx1"/>
           </a:solidFill>
@@ -2833,16 +2838,16 @@
           <a:cs typeface="+mn-cs"/>
         </a:defRPr>
       </a:lvl8pPr>
-      <a:lvl9pPr marL="5181470" indent="-304792" algn="l" defTabSz="1219170" rtl="0" eaLnBrk="1" latinLnBrk="0" hangingPunct="1">
+      <a:lvl9pPr marL="4974336" indent="-292608" algn="l" defTabSz="1170432" rtl="0" eaLnBrk="1" latinLnBrk="0" hangingPunct="1">
         <a:lnSpc>
           <a:spcPct val="90000"/>
         </a:lnSpc>
         <a:spcBef>
-          <a:spcPts val="667"/>
+          <a:spcPts val="640"/>
         </a:spcBef>
         <a:buFont typeface="Arial" panose="020B0604020202020204" pitchFamily="34" charset="0"/>
         <a:buChar char="•"/>
-        <a:defRPr sz="2400" kern="1200">
+        <a:defRPr sz="2304" kern="1200">
           <a:solidFill>
             <a:schemeClr val="tx1"/>
           </a:solidFill>
@@ -2856,8 +2861,8 @@
       <a:defPPr>
         <a:defRPr lang="en-US"/>
       </a:defPPr>
-      <a:lvl1pPr marL="0" algn="l" defTabSz="1219170" rtl="0" eaLnBrk="1" latinLnBrk="0" hangingPunct="1">
-        <a:defRPr sz="2400" kern="1200">
+      <a:lvl1pPr marL="0" algn="l" defTabSz="1170432" rtl="0" eaLnBrk="1" latinLnBrk="0" hangingPunct="1">
+        <a:defRPr sz="2304" kern="1200">
           <a:solidFill>
             <a:schemeClr val="tx1"/>
           </a:solidFill>
@@ -2866,8 +2871,8 @@
           <a:cs typeface="+mn-cs"/>
         </a:defRPr>
       </a:lvl1pPr>
-      <a:lvl2pPr marL="609585" algn="l" defTabSz="1219170" rtl="0" eaLnBrk="1" latinLnBrk="0" hangingPunct="1">
-        <a:defRPr sz="2400" kern="1200">
+      <a:lvl2pPr marL="585216" algn="l" defTabSz="1170432" rtl="0" eaLnBrk="1" latinLnBrk="0" hangingPunct="1">
+        <a:defRPr sz="2304" kern="1200">
           <a:solidFill>
             <a:schemeClr val="tx1"/>
           </a:solidFill>
@@ -2876,8 +2881,8 @@
           <a:cs typeface="+mn-cs"/>
         </a:defRPr>
       </a:lvl2pPr>
-      <a:lvl3pPr marL="1219170" algn="l" defTabSz="1219170" rtl="0" eaLnBrk="1" latinLnBrk="0" hangingPunct="1">
-        <a:defRPr sz="2400" kern="1200">
+      <a:lvl3pPr marL="1170432" algn="l" defTabSz="1170432" rtl="0" eaLnBrk="1" latinLnBrk="0" hangingPunct="1">
+        <a:defRPr sz="2304" kern="1200">
           <a:solidFill>
             <a:schemeClr val="tx1"/>
           </a:solidFill>
@@ -2886,8 +2891,8 @@
           <a:cs typeface="+mn-cs"/>
         </a:defRPr>
       </a:lvl3pPr>
-      <a:lvl4pPr marL="1828754" algn="l" defTabSz="1219170" rtl="0" eaLnBrk="1" latinLnBrk="0" hangingPunct="1">
-        <a:defRPr sz="2400" kern="1200">
+      <a:lvl4pPr marL="1755648" algn="l" defTabSz="1170432" rtl="0" eaLnBrk="1" latinLnBrk="0" hangingPunct="1">
+        <a:defRPr sz="2304" kern="1200">
           <a:solidFill>
             <a:schemeClr val="tx1"/>
           </a:solidFill>
@@ -2896,8 +2901,8 @@
           <a:cs typeface="+mn-cs"/>
         </a:defRPr>
       </a:lvl4pPr>
-      <a:lvl5pPr marL="2438339" algn="l" defTabSz="1219170" rtl="0" eaLnBrk="1" latinLnBrk="0" hangingPunct="1">
-        <a:defRPr sz="2400" kern="1200">
+      <a:lvl5pPr marL="2340864" algn="l" defTabSz="1170432" rtl="0" eaLnBrk="1" latinLnBrk="0" hangingPunct="1">
+        <a:defRPr sz="2304" kern="1200">
           <a:solidFill>
             <a:schemeClr val="tx1"/>
           </a:solidFill>
@@ -2906,8 +2911,8 @@
           <a:cs typeface="+mn-cs"/>
         </a:defRPr>
       </a:lvl5pPr>
-      <a:lvl6pPr marL="3047924" algn="l" defTabSz="1219170" rtl="0" eaLnBrk="1" latinLnBrk="0" hangingPunct="1">
-        <a:defRPr sz="2400" kern="1200">
+      <a:lvl6pPr marL="2926080" algn="l" defTabSz="1170432" rtl="0" eaLnBrk="1" latinLnBrk="0" hangingPunct="1">
+        <a:defRPr sz="2304" kern="1200">
           <a:solidFill>
             <a:schemeClr val="tx1"/>
           </a:solidFill>
@@ -2916,8 +2921,8 @@
           <a:cs typeface="+mn-cs"/>
         </a:defRPr>
       </a:lvl6pPr>
-      <a:lvl7pPr marL="3657509" algn="l" defTabSz="1219170" rtl="0" eaLnBrk="1" latinLnBrk="0" hangingPunct="1">
-        <a:defRPr sz="2400" kern="1200">
+      <a:lvl7pPr marL="3511296" algn="l" defTabSz="1170432" rtl="0" eaLnBrk="1" latinLnBrk="0" hangingPunct="1">
+        <a:defRPr sz="2304" kern="1200">
           <a:solidFill>
             <a:schemeClr val="tx1"/>
           </a:solidFill>
@@ -2926,8 +2931,8 @@
           <a:cs typeface="+mn-cs"/>
         </a:defRPr>
       </a:lvl7pPr>
-      <a:lvl8pPr marL="4267093" algn="l" defTabSz="1219170" rtl="0" eaLnBrk="1" latinLnBrk="0" hangingPunct="1">
-        <a:defRPr sz="2400" kern="1200">
+      <a:lvl8pPr marL="4096512" algn="l" defTabSz="1170432" rtl="0" eaLnBrk="1" latinLnBrk="0" hangingPunct="1">
+        <a:defRPr sz="2304" kern="1200">
           <a:solidFill>
             <a:schemeClr val="tx1"/>
           </a:solidFill>
@@ -2936,8 +2941,8 @@
           <a:cs typeface="+mn-cs"/>
         </a:defRPr>
       </a:lvl8pPr>
-      <a:lvl9pPr marL="4876678" algn="l" defTabSz="1219170" rtl="0" eaLnBrk="1" latinLnBrk="0" hangingPunct="1">
-        <a:defRPr sz="2400" kern="1200">
+      <a:lvl9pPr marL="4681728" algn="l" defTabSz="1170432" rtl="0" eaLnBrk="1" latinLnBrk="0" hangingPunct="1">
+        <a:defRPr sz="2304" kern="1200">
           <a:solidFill>
             <a:schemeClr val="tx1"/>
           </a:solidFill>
@@ -2982,7 +2987,7 @@
         </p:nvSpPr>
         <p:spPr>
           <a:xfrm>
-            <a:off x="258792" y="293299"/>
+            <a:off x="271144" y="1132677"/>
             <a:ext cx="1819729" cy="707886"/>
           </a:xfrm>
           <a:prstGeom prst="rect">
@@ -3028,7 +3033,7 @@
         </p:nvSpPr>
         <p:spPr>
           <a:xfrm>
-            <a:off x="258792" y="1135812"/>
+            <a:off x="271144" y="1975190"/>
             <a:ext cx="1819729" cy="707886"/>
           </a:xfrm>
           <a:prstGeom prst="rect">
@@ -3067,7 +3072,7 @@
         </p:nvSpPr>
         <p:spPr>
           <a:xfrm>
-            <a:off x="258791" y="1978325"/>
+            <a:off x="271143" y="2817703"/>
             <a:ext cx="1819729" cy="707886"/>
           </a:xfrm>
           <a:prstGeom prst="rect">
@@ -3106,7 +3111,7 @@
         </p:nvSpPr>
         <p:spPr>
           <a:xfrm>
-            <a:off x="258790" y="2821098"/>
+            <a:off x="271142" y="3660476"/>
             <a:ext cx="1819729" cy="707886"/>
           </a:xfrm>
           <a:prstGeom prst="rect">
@@ -3145,7 +3150,7 @@
         </p:nvSpPr>
         <p:spPr>
           <a:xfrm>
-            <a:off x="258789" y="4353725"/>
+            <a:off x="271141" y="5193103"/>
             <a:ext cx="1819729" cy="707886"/>
           </a:xfrm>
           <a:prstGeom prst="rect">
@@ -3184,7 +3189,7 @@
         </p:nvSpPr>
         <p:spPr>
           <a:xfrm flipH="1">
-            <a:off x="935741" y="3546237"/>
+            <a:off x="948092" y="4385616"/>
             <a:ext cx="599760" cy="584775"/>
           </a:xfrm>
           <a:prstGeom prst="rect">
@@ -3219,7 +3224,7 @@
         </p:nvSpPr>
         <p:spPr>
           <a:xfrm>
-            <a:off x="3053747" y="296434"/>
+            <a:off x="2583595" y="1135812"/>
             <a:ext cx="3347053" cy="707886"/>
           </a:xfrm>
           <a:prstGeom prst="rect">
@@ -3268,7 +3273,7 @@
         </p:nvSpPr>
         <p:spPr>
           <a:xfrm>
-            <a:off x="3053741" y="1066186"/>
+            <a:off x="2583589" y="1905565"/>
             <a:ext cx="3347053" cy="1323439"/>
           </a:xfrm>
           <a:prstGeom prst="rect">
@@ -3331,7 +3336,7 @@
         </p:nvSpPr>
         <p:spPr>
           <a:xfrm>
-            <a:off x="3053740" y="2491591"/>
+            <a:off x="2583588" y="3330969"/>
             <a:ext cx="3347053" cy="1077218"/>
           </a:xfrm>
           <a:prstGeom prst="rect">
@@ -3373,7 +3378,7 @@
         </p:nvSpPr>
         <p:spPr>
           <a:xfrm>
-            <a:off x="3053743" y="6714992"/>
+            <a:off x="2583591" y="7554370"/>
             <a:ext cx="3347053" cy="707886"/>
           </a:xfrm>
           <a:prstGeom prst="rect">
@@ -3415,7 +3420,7 @@
         </p:nvSpPr>
         <p:spPr>
           <a:xfrm>
-            <a:off x="3053740" y="3710591"/>
+            <a:off x="2583588" y="4549969"/>
             <a:ext cx="3347053" cy="1077218"/>
           </a:xfrm>
           <a:prstGeom prst="rect">
@@ -3457,7 +3462,7 @@
         </p:nvSpPr>
         <p:spPr>
           <a:xfrm>
-            <a:off x="3053742" y="5495992"/>
+            <a:off x="2583590" y="6335370"/>
             <a:ext cx="3347053" cy="1077218"/>
           </a:xfrm>
           <a:prstGeom prst="rect">
@@ -3499,7 +3504,7 @@
         </p:nvSpPr>
         <p:spPr>
           <a:xfrm>
-            <a:off x="3053744" y="7564660"/>
+            <a:off x="2583592" y="8404038"/>
             <a:ext cx="3347053" cy="707886"/>
           </a:xfrm>
           <a:prstGeom prst="rect">
@@ -3541,7 +3546,7 @@
         </p:nvSpPr>
         <p:spPr>
           <a:xfrm>
-            <a:off x="3053744" y="8870049"/>
+            <a:off x="2583592" y="9709427"/>
             <a:ext cx="3347053" cy="707886"/>
           </a:xfrm>
           <a:prstGeom prst="rect">
@@ -3583,7 +3588,7 @@
         </p:nvSpPr>
         <p:spPr>
           <a:xfrm>
-            <a:off x="3053739" y="9719393"/>
+            <a:off x="2583587" y="10558772"/>
             <a:ext cx="3347053" cy="646331"/>
           </a:xfrm>
           <a:prstGeom prst="rect">
@@ -3621,7 +3626,7 @@
         </p:nvSpPr>
         <p:spPr>
           <a:xfrm flipH="1">
-            <a:off x="4427390" y="8167907"/>
+            <a:off x="3957237" y="9007286"/>
             <a:ext cx="599760" cy="584775"/>
           </a:xfrm>
           <a:prstGeom prst="rect">
@@ -3656,7 +3661,7 @@
         </p:nvSpPr>
         <p:spPr>
           <a:xfrm flipH="1">
-            <a:off x="4427386" y="4763705"/>
+            <a:off x="3957233" y="5603084"/>
             <a:ext cx="599760" cy="584775"/>
           </a:xfrm>
           <a:prstGeom prst="rect">
@@ -3679,10 +3684,10 @@
       </p:sp>
       <p:cxnSp>
         <p:nvCxnSpPr>
-          <p:cNvPr id="28" name="Straight Connector 27">
+          <p:cNvPr id="30" name="Straight Connector 29">
             <a:extLst>
               <a:ext uri="{FF2B5EF4-FFF2-40B4-BE49-F238E27FC236}">
-                <a16:creationId xmlns:a16="http://schemas.microsoft.com/office/drawing/2014/main" id="{20157F5C-CD44-AB85-F734-471CBDB43C95}"/>
+                <a16:creationId xmlns:a16="http://schemas.microsoft.com/office/drawing/2014/main" id="{D3A6891A-2362-E736-75CF-A04C2225E922}"/>
               </a:ext>
             </a:extLst>
           </p:cNvPr>
@@ -3692,18 +3697,533 @@
           <p:nvPr/>
         </p:nvCxnSpPr>
         <p:spPr>
-          <a:xfrm>
-            <a:off x="6631291" y="7098715"/>
-            <a:ext cx="772502" cy="0"/>
+          <a:xfrm flipV="1">
+            <a:off x="2462943" y="1456725"/>
+            <a:ext cx="0" cy="9520839"/>
           </a:xfrm>
           <a:prstGeom prst="line">
             <a:avLst/>
           </a:prstGeom>
-          <a:ln w="47625">
+          <a:ln w="44450">
             <a:solidFill>
               <a:schemeClr val="tx1"/>
             </a:solidFill>
-            <a:tailEnd type="triangle" w="lg" len="lg"/>
+          </a:ln>
+        </p:spPr>
+        <p:style>
+          <a:lnRef idx="2">
+            <a:schemeClr val="accent1"/>
+          </a:lnRef>
+          <a:fillRef idx="0">
+            <a:schemeClr val="accent1"/>
+          </a:fillRef>
+          <a:effectRef idx="1">
+            <a:schemeClr val="accent1"/>
+          </a:effectRef>
+          <a:fontRef idx="minor">
+            <a:schemeClr val="tx1"/>
+          </a:fontRef>
+        </p:style>
+      </p:cxnSp>
+      <p:sp>
+        <p:nvSpPr>
+          <p:cNvPr id="32" name="TextBox 31">
+            <a:extLst>
+              <a:ext uri="{FF2B5EF4-FFF2-40B4-BE49-F238E27FC236}">
+                <a16:creationId xmlns:a16="http://schemas.microsoft.com/office/drawing/2014/main" id="{64D510EC-768E-06ED-EC18-EA0D4C7E0AFD}"/>
+              </a:ext>
+            </a:extLst>
+          </p:cNvPr>
+          <p:cNvSpPr txBox="1"/>
+          <p:nvPr/>
+        </p:nvSpPr>
+        <p:spPr>
+          <a:xfrm>
+            <a:off x="7371330" y="2330833"/>
+            <a:ext cx="3666419" cy="707886"/>
+          </a:xfrm>
+          <a:prstGeom prst="rect">
+            <a:avLst/>
+          </a:prstGeom>
+          <a:solidFill>
+            <a:schemeClr val="bg1">
+              <a:lumMod val="65000"/>
+            </a:schemeClr>
+          </a:solidFill>
+        </p:spPr>
+        <p:txBody>
+          <a:bodyPr wrap="square" rtlCol="0">
+            <a:spAutoFit/>
+          </a:bodyPr>
+          <a:lstStyle/>
+          <a:p>
+            <a:pPr algn="ctr"/>
+            <a:r>
+              <a:rPr lang="en-US" sz="4000" dirty="0">
+                <a:solidFill>
+                  <a:schemeClr val="bg1"/>
+                </a:solidFill>
+              </a:rPr>
+              <a:t>Col Info</a:t>
+            </a:r>
+          </a:p>
+        </p:txBody>
+      </p:sp>
+      <p:sp>
+        <p:nvSpPr>
+          <p:cNvPr id="34" name="TextBox 33">
+            <a:extLst>
+              <a:ext uri="{FF2B5EF4-FFF2-40B4-BE49-F238E27FC236}">
+                <a16:creationId xmlns:a16="http://schemas.microsoft.com/office/drawing/2014/main" id="{762ADAE9-A0AE-3F97-0867-F7C7DCABA66A}"/>
+              </a:ext>
+            </a:extLst>
+          </p:cNvPr>
+          <p:cNvSpPr txBox="1"/>
+          <p:nvPr/>
+        </p:nvSpPr>
+        <p:spPr>
+          <a:xfrm>
+            <a:off x="6858559" y="781869"/>
+            <a:ext cx="4652514" cy="707886"/>
+          </a:xfrm>
+          <a:prstGeom prst="rect">
+            <a:avLst/>
+          </a:prstGeom>
+          <a:solidFill>
+            <a:schemeClr val="bg1">
+              <a:lumMod val="85000"/>
+            </a:schemeClr>
+          </a:solidFill>
+        </p:spPr>
+        <p:txBody>
+          <a:bodyPr wrap="square" rtlCol="0">
+            <a:spAutoFit/>
+          </a:bodyPr>
+          <a:lstStyle/>
+          <a:p>
+            <a:pPr algn="ctr"/>
+            <a:r>
+              <a:rPr lang="en-US" sz="4000" dirty="0"/>
+              <a:t>Row Info</a:t>
+            </a:r>
+          </a:p>
+        </p:txBody>
+      </p:sp>
+      <p:sp>
+        <p:nvSpPr>
+          <p:cNvPr id="37" name="TextBox 36">
+            <a:extLst>
+              <a:ext uri="{FF2B5EF4-FFF2-40B4-BE49-F238E27FC236}">
+                <a16:creationId xmlns:a16="http://schemas.microsoft.com/office/drawing/2014/main" id="{24453CAC-20C3-1431-4BD8-7235079A3141}"/>
+              </a:ext>
+            </a:extLst>
+          </p:cNvPr>
+          <p:cNvSpPr txBox="1"/>
+          <p:nvPr/>
+        </p:nvSpPr>
+        <p:spPr>
+          <a:xfrm>
+            <a:off x="7511291" y="3133198"/>
+            <a:ext cx="3347053" cy="1077218"/>
+          </a:xfrm>
+          <a:prstGeom prst="rect">
+            <a:avLst/>
+          </a:prstGeom>
+          <a:solidFill>
+            <a:srgbClr val="E20000"/>
+          </a:solidFill>
+        </p:spPr>
+        <p:txBody>
+          <a:bodyPr wrap="square" rtlCol="0">
+            <a:spAutoFit/>
+          </a:bodyPr>
+          <a:lstStyle/>
+          <a:p>
+            <a:pPr algn="ctr"/>
+            <a:r>
+              <a:rPr lang="en-US" sz="3200" dirty="0">
+                <a:solidFill>
+                  <a:schemeClr val="bg1"/>
+                </a:solidFill>
+              </a:rPr>
+              <a:t>Uncompressed Data Row Entry</a:t>
+            </a:r>
+          </a:p>
+        </p:txBody>
+      </p:sp>
+      <p:cxnSp>
+        <p:nvCxnSpPr>
+          <p:cNvPr id="39" name="Straight Connector 38">
+            <a:extLst>
+              <a:ext uri="{FF2B5EF4-FFF2-40B4-BE49-F238E27FC236}">
+                <a16:creationId xmlns:a16="http://schemas.microsoft.com/office/drawing/2014/main" id="{172781E8-C66A-9C3C-EDDD-085E73D82280}"/>
+              </a:ext>
+            </a:extLst>
+          </p:cNvPr>
+          <p:cNvCxnSpPr>
+            <a:cxnSpLocks/>
+          </p:cNvCxnSpPr>
+          <p:nvPr/>
+        </p:nvCxnSpPr>
+        <p:spPr>
+          <a:xfrm>
+            <a:off x="2225649" y="5547046"/>
+            <a:ext cx="237295" cy="0"/>
+          </a:xfrm>
+          <a:prstGeom prst="line">
+            <a:avLst/>
+          </a:prstGeom>
+          <a:ln w="44450">
+            <a:solidFill>
+              <a:schemeClr val="tx1"/>
+            </a:solidFill>
+          </a:ln>
+        </p:spPr>
+        <p:style>
+          <a:lnRef idx="2">
+            <a:schemeClr val="accent1"/>
+          </a:lnRef>
+          <a:fillRef idx="0">
+            <a:schemeClr val="accent1"/>
+          </a:fillRef>
+          <a:effectRef idx="1">
+            <a:schemeClr val="accent1"/>
+          </a:effectRef>
+          <a:fontRef idx="minor">
+            <a:schemeClr val="tx1"/>
+          </a:fontRef>
+        </p:style>
+      </p:cxnSp>
+      <p:sp>
+        <p:nvSpPr>
+          <p:cNvPr id="41" name="TextBox 40">
+            <a:extLst>
+              <a:ext uri="{FF2B5EF4-FFF2-40B4-BE49-F238E27FC236}">
+                <a16:creationId xmlns:a16="http://schemas.microsoft.com/office/drawing/2014/main" id="{BC48111B-8B5A-EDD4-8F27-D926DB9E1BDD}"/>
+              </a:ext>
+            </a:extLst>
+          </p:cNvPr>
+          <p:cNvSpPr txBox="1"/>
+          <p:nvPr/>
+        </p:nvSpPr>
+        <p:spPr>
+          <a:xfrm>
+            <a:off x="7511291" y="4353683"/>
+            <a:ext cx="3347053" cy="1077218"/>
+          </a:xfrm>
+          <a:prstGeom prst="rect">
+            <a:avLst/>
+          </a:prstGeom>
+          <a:solidFill>
+            <a:srgbClr val="E20000"/>
+          </a:solidFill>
+        </p:spPr>
+        <p:txBody>
+          <a:bodyPr wrap="square" rtlCol="0">
+            <a:spAutoFit/>
+          </a:bodyPr>
+          <a:lstStyle/>
+          <a:p>
+            <a:pPr algn="ctr"/>
+            <a:r>
+              <a:rPr lang="en-US" sz="3200" dirty="0">
+                <a:solidFill>
+                  <a:schemeClr val="bg1"/>
+                </a:solidFill>
+              </a:rPr>
+              <a:t>Uncompressed Data Row Entry</a:t>
+            </a:r>
+          </a:p>
+        </p:txBody>
+      </p:sp>
+      <p:sp>
+        <p:nvSpPr>
+          <p:cNvPr id="42" name="TextBox 41">
+            <a:extLst>
+              <a:ext uri="{FF2B5EF4-FFF2-40B4-BE49-F238E27FC236}">
+                <a16:creationId xmlns:a16="http://schemas.microsoft.com/office/drawing/2014/main" id="{C43A6DD4-DC53-2F7B-AF59-94DF64B114AF}"/>
+              </a:ext>
+            </a:extLst>
+          </p:cNvPr>
+          <p:cNvSpPr txBox="1"/>
+          <p:nvPr/>
+        </p:nvSpPr>
+        <p:spPr>
+          <a:xfrm>
+            <a:off x="7241419" y="5486521"/>
+            <a:ext cx="3886793" cy="1323439"/>
+          </a:xfrm>
+          <a:prstGeom prst="rect">
+            <a:avLst/>
+          </a:prstGeom>
+          <a:solidFill>
+            <a:srgbClr val="AA0000"/>
+          </a:solidFill>
+        </p:spPr>
+        <p:txBody>
+          <a:bodyPr wrap="square" rtlCol="0">
+            <a:spAutoFit/>
+          </a:bodyPr>
+          <a:lstStyle/>
+          <a:p>
+            <a:pPr algn="ctr"/>
+            <a:r>
+              <a:rPr lang="en-US" sz="4000" dirty="0">
+                <a:solidFill>
+                  <a:schemeClr val="bg1"/>
+                </a:solidFill>
+              </a:rPr>
+              <a:t>Compressed Data Row Entry</a:t>
+            </a:r>
+          </a:p>
+        </p:txBody>
+      </p:sp>
+      <p:sp>
+        <p:nvSpPr>
+          <p:cNvPr id="51" name="TextBox 50">
+            <a:extLst>
+              <a:ext uri="{FF2B5EF4-FFF2-40B4-BE49-F238E27FC236}">
+                <a16:creationId xmlns:a16="http://schemas.microsoft.com/office/drawing/2014/main" id="{2264187A-1307-0A2B-D07B-2CE5EA5AC962}"/>
+              </a:ext>
+            </a:extLst>
+          </p:cNvPr>
+          <p:cNvSpPr txBox="1"/>
+          <p:nvPr/>
+        </p:nvSpPr>
+        <p:spPr>
+          <a:xfrm>
+            <a:off x="6295987" y="82620"/>
+            <a:ext cx="5227601" cy="707886"/>
+          </a:xfrm>
+          <a:prstGeom prst="rect">
+            <a:avLst/>
+          </a:prstGeom>
+          <a:noFill/>
+        </p:spPr>
+        <p:txBody>
+          <a:bodyPr wrap="square" rtlCol="0">
+            <a:spAutoFit/>
+          </a:bodyPr>
+          <a:lstStyle/>
+          <a:p>
+            <a:pPr algn="ctr"/>
+            <a:r>
+              <a:rPr lang="en-US" sz="4000" b="1" dirty="0"/>
+              <a:t>Example </a:t>
+            </a:r>
+            <a:r>
+              <a:rPr lang="en-US" sz="4000" b="1" dirty="0" err="1"/>
+              <a:t>Subheaders</a:t>
+            </a:r>
+            <a:endParaRPr lang="en-US" sz="4000" b="1" dirty="0"/>
+          </a:p>
+        </p:txBody>
+      </p:sp>
+      <p:sp>
+        <p:nvSpPr>
+          <p:cNvPr id="52" name="TextBox 51">
+            <a:extLst>
+              <a:ext uri="{FF2B5EF4-FFF2-40B4-BE49-F238E27FC236}">
+                <a16:creationId xmlns:a16="http://schemas.microsoft.com/office/drawing/2014/main" id="{EBCA2B87-9FB7-1661-96A8-C3055CCF87F7}"/>
+              </a:ext>
+            </a:extLst>
+          </p:cNvPr>
+          <p:cNvSpPr txBox="1"/>
+          <p:nvPr/>
+        </p:nvSpPr>
+        <p:spPr>
+          <a:xfrm>
+            <a:off x="6871075" y="6932991"/>
+            <a:ext cx="4652513" cy="1323439"/>
+          </a:xfrm>
+          <a:prstGeom prst="rect">
+            <a:avLst/>
+          </a:prstGeom>
+          <a:solidFill>
+            <a:srgbClr val="AA0000"/>
+          </a:solidFill>
+        </p:spPr>
+        <p:txBody>
+          <a:bodyPr wrap="square" rtlCol="0">
+            <a:spAutoFit/>
+          </a:bodyPr>
+          <a:lstStyle/>
+          <a:p>
+            <a:pPr algn="ctr"/>
+            <a:r>
+              <a:rPr lang="en-US" sz="4000" dirty="0">
+                <a:solidFill>
+                  <a:schemeClr val="bg1"/>
+                </a:solidFill>
+              </a:rPr>
+              <a:t>Compressed Data Row Entry</a:t>
+            </a:r>
+          </a:p>
+        </p:txBody>
+      </p:sp>
+      <p:sp>
+        <p:nvSpPr>
+          <p:cNvPr id="53" name="TextBox 52">
+            <a:extLst>
+              <a:ext uri="{FF2B5EF4-FFF2-40B4-BE49-F238E27FC236}">
+                <a16:creationId xmlns:a16="http://schemas.microsoft.com/office/drawing/2014/main" id="{5D0A8845-DC7E-8E0A-671A-23CC7C3738ED}"/>
+              </a:ext>
+            </a:extLst>
+          </p:cNvPr>
+          <p:cNvSpPr txBox="1"/>
+          <p:nvPr/>
+        </p:nvSpPr>
+        <p:spPr>
+          <a:xfrm>
+            <a:off x="7494485" y="8325545"/>
+            <a:ext cx="3363859" cy="1938992"/>
+          </a:xfrm>
+          <a:prstGeom prst="rect">
+            <a:avLst/>
+          </a:prstGeom>
+          <a:solidFill>
+            <a:srgbClr val="AA0000"/>
+          </a:solidFill>
+        </p:spPr>
+        <p:txBody>
+          <a:bodyPr wrap="square" rtlCol="0">
+            <a:spAutoFit/>
+          </a:bodyPr>
+          <a:lstStyle/>
+          <a:p>
+            <a:pPr algn="ctr"/>
+            <a:r>
+              <a:rPr lang="en-US" sz="4000" dirty="0">
+                <a:solidFill>
+                  <a:schemeClr val="bg1"/>
+                </a:solidFill>
+              </a:rPr>
+              <a:t>Compressed Data Row Entry</a:t>
+            </a:r>
+          </a:p>
+        </p:txBody>
+      </p:sp>
+      <p:sp>
+        <p:nvSpPr>
+          <p:cNvPr id="58" name="TextBox 57">
+            <a:extLst>
+              <a:ext uri="{FF2B5EF4-FFF2-40B4-BE49-F238E27FC236}">
+                <a16:creationId xmlns:a16="http://schemas.microsoft.com/office/drawing/2014/main" id="{D0857D9E-2260-DFE1-09D5-5098D6F41F2B}"/>
+              </a:ext>
+            </a:extLst>
+          </p:cNvPr>
+          <p:cNvSpPr txBox="1"/>
+          <p:nvPr/>
+        </p:nvSpPr>
+        <p:spPr>
+          <a:xfrm>
+            <a:off x="6934458" y="10317540"/>
+            <a:ext cx="4370828" cy="1569660"/>
+          </a:xfrm>
+          <a:prstGeom prst="rect">
+            <a:avLst/>
+          </a:prstGeom>
+          <a:noFill/>
+        </p:spPr>
+        <p:txBody>
+          <a:bodyPr wrap="square" rtlCol="0">
+            <a:spAutoFit/>
+          </a:bodyPr>
+          <a:lstStyle/>
+          <a:p>
+            <a:pPr algn="ctr"/>
+            <a:r>
+              <a:rPr lang="en-US" sz="3200" b="1" dirty="0"/>
+              <a:t>Variable size</a:t>
+            </a:r>
+          </a:p>
+          <a:p>
+            <a:pPr algn="ctr"/>
+            <a:r>
+              <a:rPr lang="en-US" sz="3200" b="1" dirty="0"/>
+              <a:t>(informed by </a:t>
+            </a:r>
+            <a:r>
+              <a:rPr lang="en-US" sz="3200" b="1" dirty="0" err="1"/>
+              <a:t>subheader</a:t>
+            </a:r>
+            <a:r>
+              <a:rPr lang="en-US" sz="3200" b="1" dirty="0"/>
+              <a:t> pointers)</a:t>
+            </a:r>
+          </a:p>
+        </p:txBody>
+      </p:sp>
+      <p:sp>
+        <p:nvSpPr>
+          <p:cNvPr id="59" name="TextBox 58">
+            <a:extLst>
+              <a:ext uri="{FF2B5EF4-FFF2-40B4-BE49-F238E27FC236}">
+                <a16:creationId xmlns:a16="http://schemas.microsoft.com/office/drawing/2014/main" id="{0BF766F4-67B8-9D6E-74C9-D12D31E93430}"/>
+              </a:ext>
+            </a:extLst>
+          </p:cNvPr>
+          <p:cNvSpPr txBox="1"/>
+          <p:nvPr/>
+        </p:nvSpPr>
+        <p:spPr>
+          <a:xfrm>
+            <a:off x="7940160" y="1528469"/>
+            <a:ext cx="2489313" cy="707886"/>
+          </a:xfrm>
+          <a:prstGeom prst="rect">
+            <a:avLst/>
+          </a:prstGeom>
+          <a:solidFill>
+            <a:schemeClr val="bg1">
+              <a:lumMod val="65000"/>
+            </a:schemeClr>
+          </a:solidFill>
+        </p:spPr>
+        <p:txBody>
+          <a:bodyPr wrap="square" rtlCol="0">
+            <a:spAutoFit/>
+          </a:bodyPr>
+          <a:lstStyle/>
+          <a:p>
+            <a:pPr algn="ctr"/>
+            <a:r>
+              <a:rPr lang="en-US" sz="4000" dirty="0">
+                <a:solidFill>
+                  <a:schemeClr val="bg1"/>
+                </a:solidFill>
+              </a:rPr>
+              <a:t>Col Info</a:t>
+            </a:r>
+          </a:p>
+        </p:txBody>
+      </p:sp>
+      <p:cxnSp>
+        <p:nvCxnSpPr>
+          <p:cNvPr id="5" name="Straight Connector 4">
+            <a:extLst>
+              <a:ext uri="{FF2B5EF4-FFF2-40B4-BE49-F238E27FC236}">
+                <a16:creationId xmlns:a16="http://schemas.microsoft.com/office/drawing/2014/main" id="{FC2549D0-FF53-60B2-4BA8-5B4F11420F34}"/>
+              </a:ext>
+            </a:extLst>
+          </p:cNvPr>
+          <p:cNvCxnSpPr>
+            <a:cxnSpLocks/>
+          </p:cNvCxnSpPr>
+          <p:nvPr/>
+        </p:nvCxnSpPr>
+        <p:spPr>
+          <a:xfrm>
+            <a:off x="6081895" y="7910082"/>
+            <a:ext cx="437883" cy="0"/>
+          </a:xfrm>
+          <a:prstGeom prst="line">
+            <a:avLst/>
+          </a:prstGeom>
+          <a:ln w="44450">
+            <a:solidFill>
+              <a:schemeClr val="tx1"/>
+            </a:solidFill>
           </a:ln>
         </p:spPr>
         <p:style>
@@ -3723,10 +4243,10 @@
       </p:cxnSp>
       <p:cxnSp>
         <p:nvCxnSpPr>
-          <p:cNvPr id="30" name="Straight Connector 29">
+          <p:cNvPr id="11" name="Straight Connector 10">
             <a:extLst>
               <a:ext uri="{FF2B5EF4-FFF2-40B4-BE49-F238E27FC236}">
-                <a16:creationId xmlns:a16="http://schemas.microsoft.com/office/drawing/2014/main" id="{D3A6891A-2362-E736-75CF-A04C2225E922}"/>
+                <a16:creationId xmlns:a16="http://schemas.microsoft.com/office/drawing/2014/main" id="{0FE6B204-A8B8-F0B0-3734-1674D65C6A3F}"/>
               </a:ext>
             </a:extLst>
           </p:cNvPr>
@@ -3737,8 +4257,8 @@
         </p:nvCxnSpPr>
         <p:spPr>
           <a:xfrm flipV="1">
-            <a:off x="2829466" y="588060"/>
-            <a:ext cx="0" cy="9520839"/>
+            <a:off x="6496574" y="941827"/>
+            <a:ext cx="0" cy="9953327"/>
           </a:xfrm>
           <a:prstGeom prst="line">
             <a:avLst/>
@@ -3766,10 +4286,10 @@
       </p:cxnSp>
       <p:sp>
         <p:nvSpPr>
-          <p:cNvPr id="32" name="TextBox 31">
+          <p:cNvPr id="15" name="TextBox 14">
             <a:extLst>
               <a:ext uri="{FF2B5EF4-FFF2-40B4-BE49-F238E27FC236}">
-                <a16:creationId xmlns:a16="http://schemas.microsoft.com/office/drawing/2014/main" id="{64D510EC-768E-06ED-EC18-EA0D4C7E0AFD}"/>
+                <a16:creationId xmlns:a16="http://schemas.microsoft.com/office/drawing/2014/main" id="{ADB7382A-2B5A-D4BB-18D0-23AA30F05A91}"/>
               </a:ext>
             </a:extLst>
           </p:cNvPr>
@@ -3778,261 +4298,8 @@
         </p:nvSpPr>
         <p:spPr>
           <a:xfrm>
-            <a:off x="7824076" y="2355943"/>
-            <a:ext cx="3666419" cy="707886"/>
-          </a:xfrm>
-          <a:prstGeom prst="rect">
-            <a:avLst/>
-          </a:prstGeom>
-          <a:solidFill>
-            <a:schemeClr val="bg1">
-              <a:lumMod val="65000"/>
-            </a:schemeClr>
-          </a:solidFill>
-        </p:spPr>
-        <p:txBody>
-          <a:bodyPr wrap="square" rtlCol="0">
-            <a:spAutoFit/>
-          </a:bodyPr>
-          <a:lstStyle/>
-          <a:p>
-            <a:pPr algn="ctr"/>
-            <a:r>
-              <a:rPr lang="en-US" sz="4000" dirty="0">
-                <a:solidFill>
-                  <a:schemeClr val="bg1"/>
-                </a:solidFill>
-              </a:rPr>
-              <a:t>Col Info</a:t>
-            </a:r>
-          </a:p>
-        </p:txBody>
-      </p:sp>
-      <p:sp>
-        <p:nvSpPr>
-          <p:cNvPr id="34" name="TextBox 33">
-            <a:extLst>
-              <a:ext uri="{FF2B5EF4-FFF2-40B4-BE49-F238E27FC236}">
-                <a16:creationId xmlns:a16="http://schemas.microsoft.com/office/drawing/2014/main" id="{762ADAE9-A0AE-3F97-0867-F7C7DCABA66A}"/>
-              </a:ext>
-            </a:extLst>
-          </p:cNvPr>
-          <p:cNvSpPr txBox="1"/>
-          <p:nvPr/>
-        </p:nvSpPr>
-        <p:spPr>
-          <a:xfrm>
-            <a:off x="7311306" y="806979"/>
-            <a:ext cx="4652514" cy="707886"/>
-          </a:xfrm>
-          <a:prstGeom prst="rect">
-            <a:avLst/>
-          </a:prstGeom>
-          <a:solidFill>
-            <a:schemeClr val="bg1">
-              <a:lumMod val="85000"/>
-            </a:schemeClr>
-          </a:solidFill>
-        </p:spPr>
-        <p:txBody>
-          <a:bodyPr wrap="square" rtlCol="0">
-            <a:spAutoFit/>
-          </a:bodyPr>
-          <a:lstStyle/>
-          <a:p>
-            <a:pPr algn="ctr"/>
-            <a:r>
-              <a:rPr lang="en-US" sz="4000" dirty="0"/>
-              <a:t>Row Info</a:t>
-            </a:r>
-          </a:p>
-        </p:txBody>
-      </p:sp>
-      <p:sp>
-        <p:nvSpPr>
-          <p:cNvPr id="37" name="TextBox 36">
-            <a:extLst>
-              <a:ext uri="{FF2B5EF4-FFF2-40B4-BE49-F238E27FC236}">
-                <a16:creationId xmlns:a16="http://schemas.microsoft.com/office/drawing/2014/main" id="{24453CAC-20C3-1431-4BD8-7235079A3141}"/>
-              </a:ext>
-            </a:extLst>
-          </p:cNvPr>
-          <p:cNvSpPr txBox="1"/>
-          <p:nvPr/>
-        </p:nvSpPr>
-        <p:spPr>
-          <a:xfrm>
-            <a:off x="7964037" y="3158308"/>
-            <a:ext cx="3347053" cy="1077218"/>
-          </a:xfrm>
-          <a:prstGeom prst="rect">
-            <a:avLst/>
-          </a:prstGeom>
-          <a:solidFill>
-            <a:srgbClr val="E20000"/>
-          </a:solidFill>
-        </p:spPr>
-        <p:txBody>
-          <a:bodyPr wrap="square" rtlCol="0">
-            <a:spAutoFit/>
-          </a:bodyPr>
-          <a:lstStyle/>
-          <a:p>
-            <a:pPr algn="ctr"/>
-            <a:r>
-              <a:rPr lang="en-US" sz="3200" dirty="0">
-                <a:solidFill>
-                  <a:schemeClr val="bg1"/>
-                </a:solidFill>
-              </a:rPr>
-              <a:t>Uncompressed Data Row Entry</a:t>
-            </a:r>
-          </a:p>
-        </p:txBody>
-      </p:sp>
-      <p:cxnSp>
-        <p:nvCxnSpPr>
-          <p:cNvPr id="39" name="Straight Connector 38">
-            <a:extLst>
-              <a:ext uri="{FF2B5EF4-FFF2-40B4-BE49-F238E27FC236}">
-                <a16:creationId xmlns:a16="http://schemas.microsoft.com/office/drawing/2014/main" id="{172781E8-C66A-9C3C-EDDD-085E73D82280}"/>
-              </a:ext>
-            </a:extLst>
-          </p:cNvPr>
-          <p:cNvCxnSpPr>
-            <a:cxnSpLocks/>
-          </p:cNvCxnSpPr>
-          <p:nvPr/>
-        </p:nvCxnSpPr>
-        <p:spPr>
-          <a:xfrm>
-            <a:off x="2286449" y="4707668"/>
-            <a:ext cx="543017" cy="0"/>
-          </a:xfrm>
-          <a:prstGeom prst="line">
-            <a:avLst/>
-          </a:prstGeom>
-          <a:ln w="44450">
-            <a:solidFill>
-              <a:schemeClr val="tx1"/>
-            </a:solidFill>
-          </a:ln>
-        </p:spPr>
-        <p:style>
-          <a:lnRef idx="2">
-            <a:schemeClr val="accent1"/>
-          </a:lnRef>
-          <a:fillRef idx="0">
-            <a:schemeClr val="accent1"/>
-          </a:fillRef>
-          <a:effectRef idx="1">
-            <a:schemeClr val="accent1"/>
-          </a:effectRef>
-          <a:fontRef idx="minor">
-            <a:schemeClr val="tx1"/>
-          </a:fontRef>
-        </p:style>
-      </p:cxnSp>
-      <p:sp>
-        <p:nvSpPr>
-          <p:cNvPr id="41" name="TextBox 40">
-            <a:extLst>
-              <a:ext uri="{FF2B5EF4-FFF2-40B4-BE49-F238E27FC236}">
-                <a16:creationId xmlns:a16="http://schemas.microsoft.com/office/drawing/2014/main" id="{BC48111B-8B5A-EDD4-8F27-D926DB9E1BDD}"/>
-              </a:ext>
-            </a:extLst>
-          </p:cNvPr>
-          <p:cNvSpPr txBox="1"/>
-          <p:nvPr/>
-        </p:nvSpPr>
-        <p:spPr>
-          <a:xfrm>
-            <a:off x="7964037" y="4378793"/>
-            <a:ext cx="3347053" cy="1077218"/>
-          </a:xfrm>
-          <a:prstGeom prst="rect">
-            <a:avLst/>
-          </a:prstGeom>
-          <a:solidFill>
-            <a:srgbClr val="E20000"/>
-          </a:solidFill>
-        </p:spPr>
-        <p:txBody>
-          <a:bodyPr wrap="square" rtlCol="0">
-            <a:spAutoFit/>
-          </a:bodyPr>
-          <a:lstStyle/>
-          <a:p>
-            <a:pPr algn="ctr"/>
-            <a:r>
-              <a:rPr lang="en-US" sz="3200" dirty="0">
-                <a:solidFill>
-                  <a:schemeClr val="bg1"/>
-                </a:solidFill>
-              </a:rPr>
-              <a:t>Uncompressed Data Row Entry</a:t>
-            </a:r>
-          </a:p>
-        </p:txBody>
-      </p:sp>
-      <p:sp>
-        <p:nvSpPr>
-          <p:cNvPr id="42" name="TextBox 41">
-            <a:extLst>
-              <a:ext uri="{FF2B5EF4-FFF2-40B4-BE49-F238E27FC236}">
-                <a16:creationId xmlns:a16="http://schemas.microsoft.com/office/drawing/2014/main" id="{C43A6DD4-DC53-2F7B-AF59-94DF64B114AF}"/>
-              </a:ext>
-            </a:extLst>
-          </p:cNvPr>
-          <p:cNvSpPr txBox="1"/>
-          <p:nvPr/>
-        </p:nvSpPr>
-        <p:spPr>
-          <a:xfrm>
-            <a:off x="7694165" y="6008992"/>
-            <a:ext cx="3886793" cy="1323439"/>
-          </a:xfrm>
-          <a:prstGeom prst="rect">
-            <a:avLst/>
-          </a:prstGeom>
-          <a:solidFill>
-            <a:srgbClr val="AA0000"/>
-          </a:solidFill>
-        </p:spPr>
-        <p:txBody>
-          <a:bodyPr wrap="square" rtlCol="0">
-            <a:spAutoFit/>
-          </a:bodyPr>
-          <a:lstStyle/>
-          <a:p>
-            <a:pPr algn="ctr"/>
-            <a:r>
-              <a:rPr lang="en-US" sz="4000" dirty="0">
-                <a:solidFill>
-                  <a:schemeClr val="bg1"/>
-                </a:solidFill>
-              </a:rPr>
-              <a:t>Compressed Data Row Entry</a:t>
-            </a:r>
-          </a:p>
-        </p:txBody>
-      </p:sp>
-      <p:sp>
-        <p:nvSpPr>
-          <p:cNvPr id="51" name="TextBox 50">
-            <a:extLst>
-              <a:ext uri="{FF2B5EF4-FFF2-40B4-BE49-F238E27FC236}">
-                <a16:creationId xmlns:a16="http://schemas.microsoft.com/office/drawing/2014/main" id="{2264187A-1307-0A2B-D07B-2CE5EA5AC962}"/>
-              </a:ext>
-            </a:extLst>
-          </p:cNvPr>
-          <p:cNvSpPr txBox="1"/>
-          <p:nvPr/>
-        </p:nvSpPr>
-        <p:spPr>
-          <a:xfrm>
-            <a:off x="6748733" y="107730"/>
-            <a:ext cx="5227601" cy="707886"/>
+            <a:off x="2836621" y="-130576"/>
+            <a:ext cx="2612842" cy="1323439"/>
           </a:xfrm>
           <a:prstGeom prst="rect">
             <a:avLst/>
@@ -4048,223 +4315,18 @@
             <a:pPr algn="ctr"/>
             <a:r>
               <a:rPr lang="en-US" sz="4000" b="1" dirty="0"/>
-              <a:t>Example </a:t>
-            </a:r>
-            <a:r>
-              <a:rPr lang="en-US" sz="4000" b="1" dirty="0" err="1"/>
-              <a:t>Subheaders</a:t>
-            </a:r>
-            <a:endParaRPr lang="en-US" sz="4000" b="1" dirty="0"/>
-          </a:p>
-        </p:txBody>
-      </p:sp>
-      <p:sp>
-        <p:nvSpPr>
-          <p:cNvPr id="52" name="TextBox 51">
-            <a:extLst>
-              <a:ext uri="{FF2B5EF4-FFF2-40B4-BE49-F238E27FC236}">
-                <a16:creationId xmlns:a16="http://schemas.microsoft.com/office/drawing/2014/main" id="{EBCA2B87-9FB7-1661-96A8-C3055CCF87F7}"/>
-              </a:ext>
-            </a:extLst>
-          </p:cNvPr>
-          <p:cNvSpPr txBox="1"/>
-          <p:nvPr/>
-        </p:nvSpPr>
-        <p:spPr>
-          <a:xfrm>
-            <a:off x="7323821" y="7573994"/>
-            <a:ext cx="4652513" cy="1323439"/>
-          </a:xfrm>
-          <a:prstGeom prst="rect">
-            <a:avLst/>
-          </a:prstGeom>
-          <a:solidFill>
-            <a:srgbClr val="AA0000"/>
-          </a:solidFill>
-        </p:spPr>
-        <p:txBody>
-          <a:bodyPr wrap="square" rtlCol="0">
-            <a:spAutoFit/>
-          </a:bodyPr>
-          <a:lstStyle/>
+              <a:t>Example</a:t>
+            </a:r>
+          </a:p>
           <a:p>
             <a:pPr algn="ctr"/>
             <a:r>
-              <a:rPr lang="en-US" sz="4000" dirty="0">
-                <a:solidFill>
-                  <a:schemeClr val="bg1"/>
-                </a:solidFill>
-              </a:rPr>
-              <a:t>Compressed Data Row Entry</a:t>
-            </a:r>
-          </a:p>
-        </p:txBody>
-      </p:sp>
-      <p:sp>
-        <p:nvSpPr>
-          <p:cNvPr id="53" name="TextBox 52">
-            <a:extLst>
-              <a:ext uri="{FF2B5EF4-FFF2-40B4-BE49-F238E27FC236}">
-                <a16:creationId xmlns:a16="http://schemas.microsoft.com/office/drawing/2014/main" id="{5D0A8845-DC7E-8E0A-671A-23CC7C3738ED}"/>
-              </a:ext>
-            </a:extLst>
-          </p:cNvPr>
-          <p:cNvSpPr txBox="1"/>
-          <p:nvPr/>
-        </p:nvSpPr>
-        <p:spPr>
-          <a:xfrm>
-            <a:off x="7947231" y="9208852"/>
-            <a:ext cx="3363859" cy="1938992"/>
-          </a:xfrm>
-          <a:prstGeom prst="rect">
-            <a:avLst/>
-          </a:prstGeom>
-          <a:solidFill>
-            <a:srgbClr val="AA0000"/>
-          </a:solidFill>
-        </p:spPr>
-        <p:txBody>
-          <a:bodyPr wrap="square" rtlCol="0">
-            <a:spAutoFit/>
-          </a:bodyPr>
-          <a:lstStyle/>
-          <a:p>
-            <a:pPr algn="ctr"/>
-            <a:r>
-              <a:rPr lang="en-US" sz="4000" dirty="0">
-                <a:solidFill>
-                  <a:schemeClr val="bg1"/>
-                </a:solidFill>
-              </a:rPr>
-              <a:t>Compressed Data Row Entry</a:t>
-            </a:r>
-          </a:p>
-        </p:txBody>
-      </p:sp>
-      <p:sp>
-        <p:nvSpPr>
-          <p:cNvPr id="58" name="TextBox 57">
-            <a:extLst>
-              <a:ext uri="{FF2B5EF4-FFF2-40B4-BE49-F238E27FC236}">
-                <a16:creationId xmlns:a16="http://schemas.microsoft.com/office/drawing/2014/main" id="{D0857D9E-2260-DFE1-09D5-5098D6F41F2B}"/>
-              </a:ext>
-            </a:extLst>
-          </p:cNvPr>
-          <p:cNvSpPr txBox="1"/>
-          <p:nvPr/>
-        </p:nvSpPr>
-        <p:spPr>
-          <a:xfrm>
-            <a:off x="6259251" y="11175719"/>
-            <a:ext cx="5795501" cy="523220"/>
-          </a:xfrm>
-          <a:prstGeom prst="rect">
-            <a:avLst/>
-          </a:prstGeom>
-          <a:noFill/>
-        </p:spPr>
-        <p:txBody>
-          <a:bodyPr wrap="square" rtlCol="0">
-            <a:spAutoFit/>
-          </a:bodyPr>
-          <a:lstStyle/>
-          <a:p>
-            <a:pPr algn="ctr"/>
-            <a:r>
-              <a:rPr lang="en-US" sz="2800" dirty="0"/>
-              <a:t>Variable size (informed by pointers)</a:t>
-            </a:r>
-          </a:p>
-        </p:txBody>
-      </p:sp>
-      <p:sp>
-        <p:nvSpPr>
-          <p:cNvPr id="59" name="TextBox 58">
-            <a:extLst>
-              <a:ext uri="{FF2B5EF4-FFF2-40B4-BE49-F238E27FC236}">
-                <a16:creationId xmlns:a16="http://schemas.microsoft.com/office/drawing/2014/main" id="{0BF766F4-67B8-9D6E-74C9-D12D31E93430}"/>
-              </a:ext>
-            </a:extLst>
-          </p:cNvPr>
-          <p:cNvSpPr txBox="1"/>
-          <p:nvPr/>
-        </p:nvSpPr>
-        <p:spPr>
-          <a:xfrm>
-            <a:off x="8392906" y="1553579"/>
-            <a:ext cx="2489313" cy="707886"/>
-          </a:xfrm>
-          <a:prstGeom prst="rect">
-            <a:avLst/>
-          </a:prstGeom>
-          <a:solidFill>
-            <a:schemeClr val="bg1">
-              <a:lumMod val="65000"/>
-            </a:schemeClr>
-          </a:solidFill>
-        </p:spPr>
-        <p:txBody>
-          <a:bodyPr wrap="square" rtlCol="0">
-            <a:spAutoFit/>
-          </a:bodyPr>
-          <a:lstStyle/>
-          <a:p>
-            <a:pPr algn="ctr"/>
-            <a:r>
-              <a:rPr lang="en-US" sz="4000" dirty="0">
-                <a:solidFill>
-                  <a:schemeClr val="bg1"/>
-                </a:solidFill>
-              </a:rPr>
-              <a:t>Col Info</a:t>
-            </a:r>
-          </a:p>
-        </p:txBody>
-      </p:sp>
-      <p:cxnSp>
-        <p:nvCxnSpPr>
-          <p:cNvPr id="61" name="Straight Connector 60">
-            <a:extLst>
-              <a:ext uri="{FF2B5EF4-FFF2-40B4-BE49-F238E27FC236}">
-                <a16:creationId xmlns:a16="http://schemas.microsoft.com/office/drawing/2014/main" id="{46EE0533-C6CC-1935-A2E3-768842F4817E}"/>
-              </a:ext>
-            </a:extLst>
-          </p:cNvPr>
-          <p:cNvCxnSpPr>
-            <a:cxnSpLocks/>
-          </p:cNvCxnSpPr>
-          <p:nvPr/>
-        </p:nvCxnSpPr>
-        <p:spPr>
-          <a:xfrm flipV="1">
-            <a:off x="6614041" y="6714992"/>
-            <a:ext cx="0" cy="2766707"/>
-          </a:xfrm>
-          <a:prstGeom prst="line">
-            <a:avLst/>
-          </a:prstGeom>
-          <a:ln w="44450">
-            <a:solidFill>
-              <a:schemeClr val="tx1"/>
-            </a:solidFill>
-          </a:ln>
-        </p:spPr>
-        <p:style>
-          <a:lnRef idx="2">
-            <a:schemeClr val="accent1"/>
-          </a:lnRef>
-          <a:fillRef idx="0">
-            <a:schemeClr val="accent1"/>
-          </a:fillRef>
-          <a:effectRef idx="1">
-            <a:schemeClr val="accent1"/>
-          </a:effectRef>
-          <a:fontRef idx="minor">
-            <a:schemeClr val="tx1"/>
-          </a:fontRef>
-        </p:style>
-      </p:cxnSp>
+              <a:rPr lang="en-US" sz="4000" b="1" dirty="0"/>
+              <a:t>Page</a:t>
+            </a:r>
+          </a:p>
+        </p:txBody>
+      </p:sp>
     </p:spTree>
     <p:extLst>
       <p:ext uri="{BB962C8B-B14F-4D97-AF65-F5344CB8AC3E}">

</xml_diff>